<commit_message>
small changes in powerpoint slide
</commit_message>
<xml_diff>
--- a/IntroductionGeoHeatmapLecture.pptx
+++ b/IntroductionGeoHeatmapLecture.pptx
@@ -104,6 +104,11 @@
       </a:defRPr>
     </a:lvl9pPr>
   </p:defaultTextStyle>
+  <p:extLst>
+    <p:ext uri="{EFAFB233-063F-42B5-8137-9DF3F51BA10A}">
+      <p15:sldGuideLst xmlns:p15="http://schemas.microsoft.com/office/powerpoint/2012/main"/>
+    </p:ext>
+  </p:extLst>
 </p:presentation>
 </file>
 
@@ -3430,8 +3435,8 @@
         </p:nvSpPr>
         <p:spPr>
           <a:xfrm>
-            <a:off x="-1" y="1075688"/>
-            <a:ext cx="7483053" cy="5509200"/>
+            <a:off x="1" y="981923"/>
+            <a:ext cx="7483052" cy="5755422"/>
           </a:xfrm>
           <a:prstGeom prst="rect">
             <a:avLst/>
@@ -3473,7 +3478,7 @@
             </a:r>
             <a:r>
               <a:rPr lang="de-DE" sz="1600" dirty="0" err="1"/>
-              <a:t>the</a:t>
+              <a:t>your</a:t>
             </a:r>
             <a:r>
               <a:rPr lang="de-DE" sz="1600" dirty="0"/>
@@ -3489,39 +3494,15 @@
             </a:r>
             <a:r>
               <a:rPr lang="de-DE" sz="1600" dirty="0" err="1"/>
+              <a:t>from</a:t>
+            </a:r>
+            <a:r>
+              <a:rPr lang="de-DE" sz="1600" dirty="0"/>
+              <a:t> </a:t>
+            </a:r>
+            <a:r>
+              <a:rPr lang="de-DE" sz="1600" dirty="0" err="1"/>
               <a:t>google</a:t>
-            </a:r>
-            <a:r>
-              <a:rPr lang="de-DE" sz="1600" dirty="0"/>
-              <a:t> </a:t>
-            </a:r>
-            <a:r>
-              <a:rPr lang="de-DE" sz="1600" dirty="0" err="1"/>
-              <a:t>has</a:t>
-            </a:r>
-            <a:r>
-              <a:rPr lang="de-DE" sz="1600" dirty="0"/>
-              <a:t> </a:t>
-            </a:r>
-            <a:r>
-              <a:rPr lang="de-DE" sz="1600" dirty="0" err="1"/>
-              <a:t>stored</a:t>
-            </a:r>
-            <a:r>
-              <a:rPr lang="de-DE" sz="1600" dirty="0"/>
-              <a:t> </a:t>
-            </a:r>
-            <a:r>
-              <a:rPr lang="de-DE" sz="1600" dirty="0" err="1"/>
-              <a:t>about</a:t>
-            </a:r>
-            <a:r>
-              <a:rPr lang="de-DE" sz="1600" dirty="0"/>
-              <a:t> </a:t>
-            </a:r>
-            <a:r>
-              <a:rPr lang="de-DE" sz="1600" dirty="0" err="1"/>
-              <a:t>yourself</a:t>
             </a:r>
             <a:r>
               <a:rPr lang="de-DE" sz="1600" dirty="0"/>
@@ -3735,6 +3716,104 @@
             </a:r>
           </a:p>
           <a:p>
+            <a:pPr lvl="1"/>
+            <a:endParaRPr lang="de-DE" sz="1600" dirty="0"/>
+          </a:p>
+          <a:p>
+            <a:pPr marL="742950" lvl="1" indent="-285750">
+              <a:buFont typeface="Arial" panose="020B0604020202020204" pitchFamily="34" charset="0"/>
+              <a:buChar char="•"/>
+            </a:pPr>
+            <a:r>
+              <a:rPr lang="de-DE" sz="1600" dirty="0"/>
+              <a:t>Guess all </a:t>
+            </a:r>
+            <a:r>
+              <a:rPr lang="de-DE" sz="1600" dirty="0" err="1"/>
+              <a:t>the</a:t>
+            </a:r>
+            <a:r>
+              <a:rPr lang="de-DE" sz="1600" dirty="0"/>
+              <a:t> </a:t>
+            </a:r>
+            <a:r>
+              <a:rPr lang="de-DE" sz="1600" dirty="0" err="1"/>
+              <a:t>places</a:t>
+            </a:r>
+            <a:r>
+              <a:rPr lang="de-DE" sz="1600" dirty="0"/>
+              <a:t> in Berlin </a:t>
+            </a:r>
+            <a:r>
+              <a:rPr lang="de-DE" sz="1600" dirty="0" err="1"/>
+              <a:t>where</a:t>
+            </a:r>
+            <a:r>
+              <a:rPr lang="de-DE" sz="1600" dirty="0"/>
+              <a:t> </a:t>
+            </a:r>
+            <a:r>
+              <a:rPr lang="de-DE" sz="1600" dirty="0" err="1"/>
+              <a:t>the</a:t>
+            </a:r>
+            <a:r>
+              <a:rPr lang="de-DE" sz="1600" dirty="0"/>
+              <a:t> fake </a:t>
+            </a:r>
+            <a:r>
+              <a:rPr lang="de-DE" sz="1600" dirty="0" err="1"/>
+              <a:t>spiced</a:t>
+            </a:r>
+            <a:r>
+              <a:rPr lang="de-DE" sz="1600" dirty="0"/>
+              <a:t> </a:t>
+            </a:r>
+            <a:r>
+              <a:rPr lang="de-DE" sz="1600" dirty="0" err="1"/>
+              <a:t>student</a:t>
+            </a:r>
+            <a:r>
+              <a:rPr lang="de-DE" sz="1600" dirty="0"/>
+              <a:t> </a:t>
+            </a:r>
+            <a:r>
+              <a:rPr lang="de-DE" sz="1600" dirty="0" err="1"/>
+              <a:t>has</a:t>
+            </a:r>
+            <a:r>
+              <a:rPr lang="de-DE" sz="1600" dirty="0"/>
+              <a:t> </a:t>
+            </a:r>
+            <a:r>
+              <a:rPr lang="de-DE" sz="1600" dirty="0" err="1"/>
+              <a:t>been</a:t>
+            </a:r>
+            <a:r>
+              <a:rPr lang="de-DE" sz="1600" dirty="0"/>
+              <a:t> and </a:t>
+            </a:r>
+            <a:r>
+              <a:rPr lang="de-DE" sz="1600" dirty="0" err="1"/>
+              <a:t>get</a:t>
+            </a:r>
+            <a:r>
+              <a:rPr lang="de-DE" sz="1600" dirty="0"/>
+              <a:t> a </a:t>
+            </a:r>
+            <a:r>
+              <a:rPr lang="de-DE" sz="1600" dirty="0" err="1"/>
+              <a:t>prize</a:t>
+            </a:r>
+            <a:r>
+              <a:rPr lang="de-DE" sz="1600" dirty="0"/>
+              <a:t>. </a:t>
+            </a:r>
+            <a:r>
+              <a:rPr lang="de-DE" sz="1600" b="1" dirty="0"/>
+              <a:t>;-) </a:t>
+            </a:r>
+          </a:p>
+          <a:p>
             <a:pPr marL="742950" lvl="1" indent="-285750">
               <a:buFont typeface="Arial" panose="020B0604020202020204" pitchFamily="34" charset="0"/>
               <a:buChar char="•"/>
@@ -3742,53 +3821,108 @@
             <a:endParaRPr lang="de-DE" sz="1600" dirty="0"/>
           </a:p>
           <a:p>
+            <a:pPr lvl="1"/>
+            <a:r>
+              <a:rPr lang="de-DE" sz="1600" b="1" dirty="0" err="1"/>
+              <a:t>Ideas</a:t>
+            </a:r>
+            <a:r>
+              <a:rPr lang="de-DE" sz="1600" b="1" dirty="0"/>
+              <a:t> </a:t>
+            </a:r>
+            <a:r>
+              <a:rPr lang="de-DE" sz="1600" b="1" dirty="0" err="1"/>
+              <a:t>for</a:t>
+            </a:r>
+            <a:r>
+              <a:rPr lang="de-DE" sz="1600" b="1" dirty="0"/>
+              <a:t> </a:t>
+            </a:r>
+            <a:r>
+              <a:rPr lang="de-DE" sz="1600" b="1" dirty="0" err="1"/>
+              <a:t>the</a:t>
+            </a:r>
+            <a:r>
+              <a:rPr lang="de-DE" sz="1600" b="1" dirty="0"/>
+              <a:t> </a:t>
+            </a:r>
+            <a:r>
+              <a:rPr lang="de-DE" sz="1600" b="1" dirty="0" err="1"/>
+              <a:t>future</a:t>
+            </a:r>
+            <a:r>
+              <a:rPr lang="de-DE" sz="1600" b="1" dirty="0"/>
+              <a:t>:</a:t>
+            </a:r>
+          </a:p>
+          <a:p>
+            <a:pPr lvl="1"/>
+            <a:endParaRPr lang="de-DE" sz="1600" b="1" dirty="0"/>
+          </a:p>
+          <a:p>
             <a:pPr marL="742950" lvl="1" indent="-285750">
               <a:buFont typeface="Arial" panose="020B0604020202020204" pitchFamily="34" charset="0"/>
               <a:buChar char="•"/>
             </a:pPr>
             <a:r>
               <a:rPr lang="de-DE" sz="1600" dirty="0"/>
-              <a:t>Play </a:t>
-            </a:r>
-            <a:r>
-              <a:rPr lang="de-DE" sz="1600" dirty="0" err="1"/>
-              <a:t>with</a:t>
-            </a:r>
-            <a:r>
-              <a:rPr lang="de-DE" sz="1600" dirty="0"/>
-              <a:t> </a:t>
-            </a:r>
-            <a:r>
-              <a:rPr lang="de-DE" sz="1600" dirty="0" err="1"/>
-              <a:t>the</a:t>
-            </a:r>
-            <a:r>
-              <a:rPr lang="de-DE" sz="1600" dirty="0"/>
-              <a:t> </a:t>
-            </a:r>
-            <a:r>
-              <a:rPr lang="de-DE" sz="1600" dirty="0" err="1"/>
-              <a:t>Geoheatmap</a:t>
-            </a:r>
-            <a:r>
-              <a:rPr lang="de-DE" sz="1600" dirty="0"/>
-              <a:t> (</a:t>
-            </a:r>
-            <a:r>
-              <a:rPr lang="de-DE" sz="1600" dirty="0" err="1"/>
-              <a:t>layout</a:t>
-            </a:r>
-            <a:r>
-              <a:rPr lang="de-DE" sz="1600" dirty="0"/>
-              <a:t>, time </a:t>
-            </a:r>
-            <a:r>
-              <a:rPr lang="de-DE" sz="1600" dirty="0" err="1"/>
-              <a:t>range</a:t>
-            </a:r>
-            <a:r>
-              <a:rPr lang="de-DE" sz="1600" dirty="0"/>
-              <a:t>).</a:t>
+              <a:t>Use </a:t>
+            </a:r>
+            <a:r>
+              <a:rPr lang="de-DE" sz="1600" dirty="0" err="1"/>
+              <a:t>your</a:t>
+            </a:r>
+            <a:r>
+              <a:rPr lang="de-DE" sz="1600" dirty="0"/>
+              <a:t> own </a:t>
+            </a:r>
+            <a:r>
+              <a:rPr lang="de-DE" sz="1600" dirty="0" err="1"/>
+              <a:t>geoheatmap</a:t>
+            </a:r>
+            <a:r>
+              <a:rPr lang="de-DE" sz="1600" dirty="0"/>
+              <a:t> </a:t>
+            </a:r>
+            <a:r>
+              <a:rPr lang="de-DE" sz="1600" dirty="0" err="1"/>
+              <a:t>to</a:t>
+            </a:r>
+            <a:r>
+              <a:rPr lang="de-DE" sz="1600" dirty="0"/>
+              <a:t> </a:t>
+            </a:r>
+            <a:r>
+              <a:rPr lang="de-DE" sz="1600" dirty="0" err="1"/>
+              <a:t>create</a:t>
+            </a:r>
+            <a:r>
+              <a:rPr lang="de-DE" sz="1600" dirty="0"/>
+              <a:t> a </a:t>
+            </a:r>
+            <a:r>
+              <a:rPr lang="de-DE" sz="1600" dirty="0" err="1"/>
+              <a:t>dashboard</a:t>
+            </a:r>
+            <a:r>
+              <a:rPr lang="de-DE" sz="1600" dirty="0"/>
+              <a:t> </a:t>
+            </a:r>
+            <a:r>
+              <a:rPr lang="de-DE" sz="1600" dirty="0" err="1"/>
+              <a:t>about</a:t>
+            </a:r>
+            <a:r>
+              <a:rPr lang="de-DE" sz="1600" dirty="0"/>
+              <a:t> </a:t>
+            </a:r>
+            <a:r>
+              <a:rPr lang="de-DE" sz="1600" dirty="0" err="1"/>
+              <a:t>yourself</a:t>
+            </a:r>
+            <a:r>
+              <a:rPr lang="de-DE" sz="1600" dirty="0"/>
+              <a:t>?</a:t>
             </a:r>
           </a:p>
           <a:p>
@@ -3804,8 +3938,12 @@
               <a:buChar char="•"/>
             </a:pPr>
             <a:r>
-              <a:rPr lang="de-DE" sz="1600" dirty="0"/>
-              <a:t>Guess all </a:t>
+              <a:rPr lang="de-DE" sz="1600" dirty="0" err="1"/>
+              <a:t>Complete</a:t>
+            </a:r>
+            <a:r>
+              <a:rPr lang="de-DE" sz="1600" dirty="0"/>
+              <a:t> </a:t>
             </a:r>
             <a:r>
               <a:rPr lang="de-DE" sz="1600" dirty="0" err="1"/>
@@ -3817,15 +3955,15 @@
             </a:r>
             <a:r>
               <a:rPr lang="de-DE" sz="1600" dirty="0" err="1"/>
-              <a:t>places</a:t>
-            </a:r>
-            <a:r>
-              <a:rPr lang="de-DE" sz="1600" dirty="0"/>
-              <a:t> </a:t>
-            </a:r>
-            <a:r>
-              <a:rPr lang="de-DE" sz="1600" dirty="0" err="1"/>
-              <a:t>where</a:t>
+              <a:t>dashborad</a:t>
+            </a:r>
+            <a:r>
+              <a:rPr lang="de-DE" sz="1600" dirty="0"/>
+              <a:t> </a:t>
+            </a:r>
+            <a:r>
+              <a:rPr lang="de-DE" sz="1600" dirty="0" err="1"/>
+              <a:t>with</a:t>
             </a:r>
             <a:r>
               <a:rPr lang="de-DE" sz="1600" dirty="0"/>
@@ -3837,23 +3975,47 @@
             </a:r>
             <a:r>
               <a:rPr lang="de-DE" sz="1600" dirty="0"/>
-              <a:t> fake </a:t>
-            </a:r>
-            <a:r>
-              <a:rPr lang="de-DE" sz="1600" dirty="0" err="1"/>
-              <a:t>spiced</a:t>
-            </a:r>
-            <a:r>
-              <a:rPr lang="de-DE" sz="1600" dirty="0"/>
-              <a:t> </a:t>
-            </a:r>
-            <a:r>
-              <a:rPr lang="de-DE" sz="1600" dirty="0" err="1"/>
-              <a:t>student</a:t>
-            </a:r>
-            <a:r>
-              <a:rPr lang="de-DE" sz="1600" dirty="0"/>
-              <a:t> and </a:t>
+              <a:t> </a:t>
+            </a:r>
+            <a:r>
+              <a:rPr lang="de-DE" sz="1600" dirty="0" err="1"/>
+              <a:t>rest</a:t>
+            </a:r>
+            <a:r>
+              <a:rPr lang="de-DE" sz="1600" dirty="0"/>
+              <a:t> </a:t>
+            </a:r>
+            <a:r>
+              <a:rPr lang="de-DE" sz="1600" dirty="0" err="1"/>
+              <a:t>of</a:t>
+            </a:r>
+            <a:r>
+              <a:rPr lang="de-DE" sz="1600" dirty="0"/>
+              <a:t> </a:t>
+            </a:r>
+            <a:r>
+              <a:rPr lang="de-DE" sz="1600" dirty="0" err="1"/>
+              <a:t>the</a:t>
+            </a:r>
+            <a:r>
+              <a:rPr lang="de-DE" sz="1600" dirty="0"/>
+              <a:t> </a:t>
+            </a:r>
+            <a:r>
+              <a:rPr lang="de-DE" sz="1600" dirty="0" err="1"/>
+              <a:t>data</a:t>
+            </a:r>
+            <a:r>
+              <a:rPr lang="de-DE" sz="1600" dirty="0"/>
+              <a:t> </a:t>
+            </a:r>
+            <a:r>
+              <a:rPr lang="de-DE" sz="1600" dirty="0" err="1"/>
+              <a:t>you</a:t>
+            </a:r>
+            <a:r>
+              <a:rPr lang="de-DE" sz="1600" dirty="0"/>
+              <a:t> </a:t>
             </a:r>
             <a:r>
               <a:rPr lang="de-DE" sz="1600" dirty="0" err="1"/>
@@ -3861,19 +4023,63 @@
             </a:r>
             <a:r>
               <a:rPr lang="de-DE" sz="1600" dirty="0"/>
-              <a:t> a </a:t>
-            </a:r>
-            <a:r>
-              <a:rPr lang="de-DE" sz="1600" dirty="0" err="1"/>
-              <a:t>prize</a:t>
-            </a:r>
-            <a:r>
-              <a:rPr lang="de-DE" sz="1600" dirty="0"/>
-              <a:t>. </a:t>
-            </a:r>
-            <a:r>
-              <a:rPr lang="de-DE" sz="1600" b="1" dirty="0"/>
-              <a:t>;-) </a:t>
+              <a:t> </a:t>
+            </a:r>
+            <a:r>
+              <a:rPr lang="de-DE" sz="1600" dirty="0" err="1"/>
+              <a:t>from</a:t>
+            </a:r>
+            <a:r>
+              <a:rPr lang="de-DE" sz="1600" dirty="0"/>
+              <a:t> </a:t>
+            </a:r>
+            <a:r>
+              <a:rPr lang="de-DE" sz="1600" dirty="0" err="1"/>
+              <a:t>google</a:t>
+            </a:r>
+            <a:r>
+              <a:rPr lang="de-DE" sz="1600" dirty="0"/>
+              <a:t>? (</a:t>
+            </a:r>
+            <a:r>
+              <a:rPr lang="de-DE" sz="1600" dirty="0" err="1"/>
+              <a:t>youtube</a:t>
+            </a:r>
+            <a:r>
+              <a:rPr lang="de-DE" sz="1600" dirty="0"/>
+              <a:t> </a:t>
+            </a:r>
+            <a:r>
+              <a:rPr lang="de-DE" sz="1600" dirty="0" err="1"/>
+              <a:t>history</a:t>
+            </a:r>
+            <a:r>
+              <a:rPr lang="de-DE" sz="1600" dirty="0"/>
+              <a:t>, </a:t>
+            </a:r>
+            <a:r>
+              <a:rPr lang="de-DE" sz="1600" dirty="0" err="1"/>
+              <a:t>google</a:t>
+            </a:r>
+            <a:r>
+              <a:rPr lang="de-DE" sz="1600" dirty="0"/>
+              <a:t> </a:t>
+            </a:r>
+            <a:r>
+              <a:rPr lang="de-DE" sz="1600" dirty="0" err="1"/>
+              <a:t>search</a:t>
+            </a:r>
+            <a:r>
+              <a:rPr lang="de-DE" sz="1600" dirty="0"/>
+              <a:t> </a:t>
+            </a:r>
+            <a:r>
+              <a:rPr lang="de-DE" sz="1600" dirty="0" err="1"/>
+              <a:t>history</a:t>
+            </a:r>
+            <a:r>
+              <a:rPr lang="de-DE" sz="1600" dirty="0"/>
+              <a:t>, etc…)</a:t>
             </a:r>
           </a:p>
           <a:p>
@@ -3884,84 +4090,89 @@
             <a:endParaRPr lang="de-DE" sz="1600" dirty="0"/>
           </a:p>
           <a:p>
-            <a:pPr lvl="1"/>
-            <a:r>
-              <a:rPr lang="de-DE" sz="1600" b="1" dirty="0" err="1"/>
-              <a:t>Ideas</a:t>
-            </a:r>
-            <a:r>
-              <a:rPr lang="de-DE" sz="1600" b="1" dirty="0"/>
-              <a:t> </a:t>
-            </a:r>
-            <a:r>
-              <a:rPr lang="de-DE" sz="1600" b="1" dirty="0" err="1"/>
-              <a:t>for</a:t>
-            </a:r>
-            <a:r>
-              <a:rPr lang="de-DE" sz="1600" b="1" dirty="0"/>
-              <a:t> </a:t>
-            </a:r>
-            <a:r>
-              <a:rPr lang="de-DE" sz="1600" b="1" dirty="0" err="1"/>
-              <a:t>the</a:t>
-            </a:r>
-            <a:r>
-              <a:rPr lang="de-DE" sz="1600" b="1" dirty="0"/>
-              <a:t> </a:t>
-            </a:r>
-            <a:r>
-              <a:rPr lang="de-DE" sz="1600" b="1" dirty="0" err="1"/>
-              <a:t>future</a:t>
-            </a:r>
-            <a:r>
-              <a:rPr lang="de-DE" sz="1600" b="1" dirty="0"/>
-              <a:t>:</a:t>
-            </a:r>
-          </a:p>
-          <a:p>
-            <a:pPr lvl="1"/>
-            <a:endParaRPr lang="de-DE" sz="1600" b="1" dirty="0"/>
-          </a:p>
-          <a:p>
             <a:pPr marL="742950" lvl="1" indent="-285750">
               <a:buFont typeface="Arial" panose="020B0604020202020204" pitchFamily="34" charset="0"/>
               <a:buChar char="•"/>
             </a:pPr>
             <a:r>
-              <a:rPr lang="de-DE" sz="1600" dirty="0"/>
-              <a:t>Use </a:t>
-            </a:r>
-            <a:r>
-              <a:rPr lang="de-DE" sz="1600" dirty="0" err="1"/>
-              <a:t>your</a:t>
-            </a:r>
-            <a:r>
-              <a:rPr lang="de-DE" sz="1600" dirty="0"/>
-              <a:t> own </a:t>
-            </a:r>
-            <a:r>
-              <a:rPr lang="de-DE" sz="1600" dirty="0" err="1"/>
-              <a:t>geoheatmap</a:t>
-            </a:r>
-            <a:r>
-              <a:rPr lang="de-DE" sz="1600" dirty="0"/>
-              <a:t> </a:t>
-            </a:r>
-            <a:r>
-              <a:rPr lang="de-DE" sz="1600" dirty="0" err="1"/>
-              <a:t>to</a:t>
-            </a:r>
-            <a:r>
-              <a:rPr lang="de-DE" sz="1600" dirty="0"/>
-              <a:t> </a:t>
-            </a:r>
-            <a:r>
-              <a:rPr lang="de-DE" sz="1600" dirty="0" err="1"/>
-              <a:t>create</a:t>
-            </a:r>
-            <a:r>
-              <a:rPr lang="de-DE" sz="1600" dirty="0"/>
-              <a:t> a </a:t>
+              <a:rPr lang="de-DE" sz="1600" dirty="0" err="1"/>
+              <a:t>Or</a:t>
+            </a:r>
+            <a:r>
+              <a:rPr lang="de-DE" sz="1600" dirty="0"/>
+              <a:t> </a:t>
+            </a:r>
+            <a:r>
+              <a:rPr lang="de-DE" sz="1600" dirty="0" err="1"/>
+              <a:t>use</a:t>
+            </a:r>
+            <a:r>
+              <a:rPr lang="de-DE" sz="1600" dirty="0"/>
+              <a:t> </a:t>
+            </a:r>
+            <a:r>
+              <a:rPr lang="de-DE" sz="1600" dirty="0" err="1"/>
+              <a:t>current</a:t>
+            </a:r>
+            <a:r>
+              <a:rPr lang="de-DE" sz="1600" dirty="0"/>
+              <a:t> </a:t>
+            </a:r>
+            <a:r>
+              <a:rPr lang="de-DE" sz="1600" dirty="0" err="1"/>
+              <a:t>capital</a:t>
+            </a:r>
+            <a:r>
+              <a:rPr lang="de-DE" sz="1600" dirty="0"/>
+              <a:t> </a:t>
+            </a:r>
+            <a:r>
+              <a:rPr lang="de-DE" sz="1600" dirty="0" err="1"/>
+              <a:t>bikeshare</a:t>
+            </a:r>
+            <a:r>
+              <a:rPr lang="de-DE" sz="1600" dirty="0"/>
+              <a:t> </a:t>
+            </a:r>
+            <a:r>
+              <a:rPr lang="de-DE" sz="1600" dirty="0" err="1"/>
+              <a:t>location</a:t>
+            </a:r>
+            <a:r>
+              <a:rPr lang="de-DE" sz="1600" dirty="0"/>
+              <a:t> and time </a:t>
+            </a:r>
+            <a:r>
+              <a:rPr lang="de-DE" sz="1600" dirty="0" err="1"/>
+              <a:t>data</a:t>
+            </a:r>
+            <a:r>
+              <a:rPr lang="de-DE" sz="1600" dirty="0"/>
+              <a:t> and </a:t>
+            </a:r>
+            <a:r>
+              <a:rPr lang="de-DE" sz="1600" dirty="0" err="1"/>
+              <a:t>for</a:t>
+            </a:r>
+            <a:r>
+              <a:rPr lang="de-DE" sz="1600" dirty="0"/>
+              <a:t> </a:t>
+            </a:r>
+            <a:r>
+              <a:rPr lang="de-DE" sz="1600" dirty="0" err="1"/>
+              <a:t>the</a:t>
+            </a:r>
+            <a:r>
+              <a:rPr lang="de-DE" sz="1600" dirty="0"/>
+              <a:t> </a:t>
+            </a:r>
+            <a:r>
+              <a:rPr lang="de-DE" sz="1600" dirty="0" err="1"/>
+              <a:t>heatmap</a:t>
+            </a:r>
+            <a:r>
+              <a:rPr lang="de-DE" sz="1600" dirty="0"/>
+              <a:t> and </a:t>
             </a:r>
             <a:r>
               <a:rPr lang="de-DE" sz="1600" dirty="0" err="1"/>
@@ -3969,23 +4180,17 @@
             </a:r>
             <a:r>
               <a:rPr lang="de-DE" sz="1600" dirty="0"/>
-              <a:t> </a:t>
-            </a:r>
-            <a:r>
-              <a:rPr lang="de-DE" sz="1600" dirty="0" err="1"/>
-              <a:t>about</a:t>
-            </a:r>
-            <a:r>
-              <a:rPr lang="de-DE" sz="1600" dirty="0"/>
-              <a:t> </a:t>
-            </a:r>
-            <a:r>
-              <a:rPr lang="de-DE" sz="1600" dirty="0" err="1"/>
-              <a:t>yourself</a:t>
-            </a:r>
-            <a:r>
-              <a:rPr lang="de-DE" sz="1600" dirty="0"/>
-              <a:t>?</a:t>
+              <a:t>? (</a:t>
+            </a:r>
+            <a:r>
+              <a:rPr lang="de-DE" sz="1600" dirty="0">
+                <a:hlinkClick r:id="rId5" invalidUrl="https:///"/>
+              </a:rPr>
+              <a:t>https://gbfs.capitalbikeshare.com/gbfs/gbfs.json</a:t>
+            </a:r>
+            <a:r>
+              <a:rPr lang="de-DE" sz="1600" dirty="0"/>
+              <a:t>).</a:t>
             </a:r>
           </a:p>
           <a:p>
@@ -4002,47 +4207,23 @@
             </a:pPr>
             <a:r>
               <a:rPr lang="de-DE" sz="1600" dirty="0" err="1"/>
-              <a:t>Complete</a:t>
-            </a:r>
-            <a:r>
-              <a:rPr lang="de-DE" sz="1600" dirty="0"/>
-              <a:t> </a:t>
-            </a:r>
-            <a:r>
-              <a:rPr lang="de-DE" sz="1600" dirty="0" err="1"/>
-              <a:t>the</a:t>
-            </a:r>
-            <a:r>
-              <a:rPr lang="de-DE" sz="1600" dirty="0"/>
-              <a:t> </a:t>
-            </a:r>
-            <a:r>
-              <a:rPr lang="de-DE" sz="1600" dirty="0" err="1"/>
-              <a:t>dashborad</a:t>
-            </a:r>
-            <a:r>
-              <a:rPr lang="de-DE" sz="1600" dirty="0"/>
-              <a:t> </a:t>
-            </a:r>
-            <a:r>
-              <a:rPr lang="de-DE" sz="1600" dirty="0" err="1"/>
-              <a:t>with</a:t>
-            </a:r>
-            <a:r>
-              <a:rPr lang="de-DE" sz="1600" dirty="0"/>
-              <a:t> </a:t>
-            </a:r>
-            <a:r>
-              <a:rPr lang="de-DE" sz="1600" dirty="0" err="1"/>
-              <a:t>the</a:t>
-            </a:r>
-            <a:r>
-              <a:rPr lang="de-DE" sz="1600" dirty="0"/>
-              <a:t> </a:t>
-            </a:r>
-            <a:r>
-              <a:rPr lang="de-DE" sz="1600" dirty="0" err="1"/>
-              <a:t>rest</a:t>
+              <a:t>What</a:t>
+            </a:r>
+            <a:r>
+              <a:rPr lang="de-DE" sz="1600" dirty="0"/>
+              <a:t> </a:t>
+            </a:r>
+            <a:r>
+              <a:rPr lang="de-DE" sz="1600" dirty="0" err="1"/>
+              <a:t>about</a:t>
+            </a:r>
+            <a:r>
+              <a:rPr lang="de-DE" sz="1600" dirty="0"/>
+              <a:t> a </a:t>
+            </a:r>
+            <a:r>
+              <a:rPr lang="de-DE" sz="1600" dirty="0" err="1"/>
+              <a:t>heatmap</a:t>
             </a:r>
             <a:r>
               <a:rPr lang="de-DE" sz="1600" dirty="0"/>
@@ -4058,214 +4239,29 @@
             </a:r>
             <a:r>
               <a:rPr lang="de-DE" sz="1600" dirty="0" err="1"/>
-              <a:t>the</a:t>
-            </a:r>
-            <a:r>
-              <a:rPr lang="de-DE" sz="1600" dirty="0"/>
-              <a:t> </a:t>
-            </a:r>
-            <a:r>
-              <a:rPr lang="de-DE" sz="1600" dirty="0" err="1"/>
-              <a:t>data</a:t>
-            </a:r>
-            <a:r>
-              <a:rPr lang="de-DE" sz="1600" dirty="0"/>
-              <a:t> </a:t>
-            </a:r>
-            <a:r>
-              <a:rPr lang="de-DE" sz="1600" dirty="0" err="1"/>
-              <a:t>you</a:t>
-            </a:r>
-            <a:r>
-              <a:rPr lang="de-DE" sz="1600" dirty="0"/>
-              <a:t> </a:t>
-            </a:r>
-            <a:r>
-              <a:rPr lang="de-DE" sz="1600" dirty="0" err="1"/>
-              <a:t>get</a:t>
-            </a:r>
-            <a:r>
-              <a:rPr lang="de-DE" sz="1600" dirty="0"/>
-              <a:t> </a:t>
-            </a:r>
-            <a:r>
-              <a:rPr lang="de-DE" sz="1600" dirty="0" err="1"/>
-              <a:t>from</a:t>
-            </a:r>
-            <a:r>
-              <a:rPr lang="de-DE" sz="1600" dirty="0"/>
-              <a:t> </a:t>
-            </a:r>
-            <a:r>
-              <a:rPr lang="de-DE" sz="1600" dirty="0" err="1"/>
-              <a:t>google</a:t>
+              <a:t>airline</a:t>
+            </a:r>
+            <a:r>
+              <a:rPr lang="de-DE" sz="1600" dirty="0"/>
+              <a:t> </a:t>
+            </a:r>
+            <a:r>
+              <a:rPr lang="de-DE" sz="1600" dirty="0" err="1"/>
+              <a:t>traffic</a:t>
             </a:r>
             <a:r>
               <a:rPr lang="de-DE" sz="1600" dirty="0"/>
               <a:t>? (</a:t>
             </a:r>
             <a:r>
-              <a:rPr lang="de-DE" sz="1600" dirty="0" err="1"/>
-              <a:t>youtube</a:t>
-            </a:r>
-            <a:r>
-              <a:rPr lang="de-DE" sz="1600" dirty="0"/>
-              <a:t> </a:t>
-            </a:r>
-            <a:r>
-              <a:rPr lang="de-DE" sz="1600" dirty="0" err="1"/>
-              <a:t>history</a:t>
-            </a:r>
-            <a:r>
-              <a:rPr lang="de-DE" sz="1600" dirty="0"/>
-              <a:t>, </a:t>
-            </a:r>
-            <a:r>
-              <a:rPr lang="de-DE" sz="1600" dirty="0" err="1"/>
-              <a:t>google</a:t>
-            </a:r>
-            <a:r>
-              <a:rPr lang="de-DE" sz="1600" dirty="0"/>
-              <a:t> </a:t>
-            </a:r>
-            <a:r>
-              <a:rPr lang="de-DE" sz="1600" dirty="0" err="1"/>
-              <a:t>search</a:t>
-            </a:r>
-            <a:r>
-              <a:rPr lang="de-DE" sz="1600" dirty="0"/>
-              <a:t> </a:t>
-            </a:r>
-            <a:r>
-              <a:rPr lang="de-DE" sz="1600" dirty="0" err="1"/>
-              <a:t>history</a:t>
-            </a:r>
-            <a:r>
-              <a:rPr lang="de-DE" sz="1600" dirty="0"/>
-              <a:t>, etc…)</a:t>
-            </a:r>
-          </a:p>
-          <a:p>
-            <a:pPr marL="742950" lvl="1" indent="-285750">
-              <a:buFont typeface="Arial" panose="020B0604020202020204" pitchFamily="34" charset="0"/>
-              <a:buChar char="•"/>
-            </a:pPr>
-            <a:endParaRPr lang="de-DE" sz="1600" dirty="0"/>
-          </a:p>
-          <a:p>
-            <a:pPr marL="742950" lvl="1" indent="-285750">
-              <a:buFont typeface="Arial" panose="020B0604020202020204" pitchFamily="34" charset="0"/>
-              <a:buChar char="•"/>
-            </a:pPr>
-            <a:r>
-              <a:rPr lang="de-DE" sz="1600" dirty="0"/>
-              <a:t>Modify </a:t>
-            </a:r>
-            <a:r>
-              <a:rPr lang="de-DE" sz="1600" dirty="0" err="1"/>
-              <a:t>the</a:t>
-            </a:r>
-            <a:r>
-              <a:rPr lang="de-DE" sz="1600" dirty="0"/>
-              <a:t> </a:t>
-            </a:r>
-            <a:r>
-              <a:rPr lang="de-DE" sz="1600" dirty="0" err="1"/>
-              <a:t>script</a:t>
-            </a:r>
-            <a:r>
-              <a:rPr lang="de-DE" sz="1600" dirty="0"/>
-              <a:t> </a:t>
-            </a:r>
-            <a:r>
-              <a:rPr lang="de-DE" sz="1600" dirty="0" err="1"/>
-              <a:t>to</a:t>
-            </a:r>
-            <a:r>
-              <a:rPr lang="de-DE" sz="1600" dirty="0"/>
-              <a:t> handle </a:t>
-            </a:r>
-            <a:r>
-              <a:rPr lang="de-DE" sz="1600" dirty="0" err="1"/>
-              <a:t>capital</a:t>
-            </a:r>
-            <a:r>
-              <a:rPr lang="de-DE" sz="1600" dirty="0"/>
-              <a:t> </a:t>
-            </a:r>
-            <a:r>
-              <a:rPr lang="de-DE" sz="1600" dirty="0" err="1"/>
-              <a:t>bikeshare</a:t>
-            </a:r>
-            <a:r>
-              <a:rPr lang="de-DE" sz="1600" dirty="0"/>
-              <a:t> </a:t>
-            </a:r>
-            <a:r>
-              <a:rPr lang="de-DE" sz="1600" dirty="0" err="1"/>
-              <a:t>location</a:t>
-            </a:r>
-            <a:r>
-              <a:rPr lang="de-DE" sz="1600" dirty="0"/>
-              <a:t> and time </a:t>
-            </a:r>
-            <a:r>
-              <a:rPr lang="de-DE" sz="1600" dirty="0" err="1"/>
-              <a:t>data</a:t>
-            </a:r>
-            <a:r>
-              <a:rPr lang="de-DE" sz="1600" dirty="0"/>
-              <a:t> and </a:t>
-            </a:r>
-            <a:r>
-              <a:rPr lang="de-DE" sz="1600" dirty="0" err="1"/>
-              <a:t>use</a:t>
-            </a:r>
-            <a:r>
-              <a:rPr lang="de-DE" sz="1600" dirty="0"/>
-              <a:t> </a:t>
-            </a:r>
-            <a:r>
-              <a:rPr lang="de-DE" sz="1600" dirty="0" err="1"/>
-              <a:t>it</a:t>
-            </a:r>
-            <a:r>
-              <a:rPr lang="de-DE" sz="1600" dirty="0"/>
-              <a:t> </a:t>
-            </a:r>
-            <a:r>
-              <a:rPr lang="de-DE" sz="1600" dirty="0" err="1"/>
-              <a:t>for</a:t>
-            </a:r>
-            <a:r>
-              <a:rPr lang="de-DE" sz="1600" dirty="0"/>
-              <a:t> </a:t>
-            </a:r>
-            <a:r>
-              <a:rPr lang="de-DE" sz="1600" dirty="0" err="1"/>
-              <a:t>the</a:t>
-            </a:r>
-            <a:r>
-              <a:rPr lang="de-DE" sz="1600" dirty="0"/>
-              <a:t> </a:t>
-            </a:r>
-            <a:r>
-              <a:rPr lang="de-DE" sz="1600" dirty="0" err="1"/>
-              <a:t>dashboard</a:t>
-            </a:r>
-            <a:r>
-              <a:rPr lang="de-DE" sz="1600" dirty="0"/>
-              <a:t>? (</a:t>
-            </a:r>
-            <a:r>
               <a:rPr lang="de-DE" sz="1600" dirty="0">
-                <a:hlinkClick r:id="rId5" invalidUrl="https:///"/>
+                <a:hlinkClick r:id="rId6"/>
               </a:rPr>
-              <a:t>https://gbfs.capitalbikeshare.com/gbfs/gbfs.json</a:t>
-            </a:r>
-            <a:r>
-              <a:rPr lang="de-DE" sz="1600" dirty="0"/>
-              <a:t>).</a:t>
+              <a:t>https://aviation-edge.com</a:t>
+            </a:r>
+            <a:r>
+              <a:rPr lang="de-DE" sz="1600" dirty="0"/>
+              <a:t>) $$$!!!</a:t>
             </a:r>
           </a:p>
         </p:txBody>

</xml_diff>

<commit_message>
changes to ppt file
</commit_message>
<xml_diff>
--- a/IntroductionGeoHeatmapLecture.pptx
+++ b/IntroductionGeoHeatmapLecture.pptx
@@ -5,7 +5,8 @@
     <p:sldMasterId id="2147483648" r:id="rId1"/>
   </p:sldMasterIdLst>
   <p:sldIdLst>
-    <p:sldId id="256" r:id="rId2"/>
+    <p:sldId id="257" r:id="rId2"/>
+    <p:sldId id="256" r:id="rId3"/>
   </p:sldIdLst>
   <p:sldSz cx="12192000" cy="6858000"/>
   <p:notesSz cx="6858000" cy="9144000"/>
@@ -259,7 +260,7 @@
           <a:p>
             <a:fld id="{AC3A4DA2-F9D2-49C6-939E-AE8629D942AB}" type="datetimeFigureOut">
               <a:rPr lang="de-DE" smtClean="0"/>
-              <a:t>22.06.2020</a:t>
+              <a:t>24.06.2020</a:t>
             </a:fld>
             <a:endParaRPr lang="de-DE"/>
           </a:p>
@@ -457,7 +458,7 @@
           <a:p>
             <a:fld id="{AC3A4DA2-F9D2-49C6-939E-AE8629D942AB}" type="datetimeFigureOut">
               <a:rPr lang="de-DE" smtClean="0"/>
-              <a:t>22.06.2020</a:t>
+              <a:t>24.06.2020</a:t>
             </a:fld>
             <a:endParaRPr lang="de-DE"/>
           </a:p>
@@ -665,7 +666,7 @@
           <a:p>
             <a:fld id="{AC3A4DA2-F9D2-49C6-939E-AE8629D942AB}" type="datetimeFigureOut">
               <a:rPr lang="de-DE" smtClean="0"/>
-              <a:t>22.06.2020</a:t>
+              <a:t>24.06.2020</a:t>
             </a:fld>
             <a:endParaRPr lang="de-DE"/>
           </a:p>
@@ -863,7 +864,7 @@
           <a:p>
             <a:fld id="{AC3A4DA2-F9D2-49C6-939E-AE8629D942AB}" type="datetimeFigureOut">
               <a:rPr lang="de-DE" smtClean="0"/>
-              <a:t>22.06.2020</a:t>
+              <a:t>24.06.2020</a:t>
             </a:fld>
             <a:endParaRPr lang="de-DE"/>
           </a:p>
@@ -1138,7 +1139,7 @@
           <a:p>
             <a:fld id="{AC3A4DA2-F9D2-49C6-939E-AE8629D942AB}" type="datetimeFigureOut">
               <a:rPr lang="de-DE" smtClean="0"/>
-              <a:t>22.06.2020</a:t>
+              <a:t>24.06.2020</a:t>
             </a:fld>
             <a:endParaRPr lang="de-DE"/>
           </a:p>
@@ -1403,7 +1404,7 @@
           <a:p>
             <a:fld id="{AC3A4DA2-F9D2-49C6-939E-AE8629D942AB}" type="datetimeFigureOut">
               <a:rPr lang="de-DE" smtClean="0"/>
-              <a:t>22.06.2020</a:t>
+              <a:t>24.06.2020</a:t>
             </a:fld>
             <a:endParaRPr lang="de-DE"/>
           </a:p>
@@ -1815,7 +1816,7 @@
           <a:p>
             <a:fld id="{AC3A4DA2-F9D2-49C6-939E-AE8629D942AB}" type="datetimeFigureOut">
               <a:rPr lang="de-DE" smtClean="0"/>
-              <a:t>22.06.2020</a:t>
+              <a:t>24.06.2020</a:t>
             </a:fld>
             <a:endParaRPr lang="de-DE"/>
           </a:p>
@@ -1956,7 +1957,7 @@
           <a:p>
             <a:fld id="{AC3A4DA2-F9D2-49C6-939E-AE8629D942AB}" type="datetimeFigureOut">
               <a:rPr lang="de-DE" smtClean="0"/>
-              <a:t>22.06.2020</a:t>
+              <a:t>24.06.2020</a:t>
             </a:fld>
             <a:endParaRPr lang="de-DE"/>
           </a:p>
@@ -2069,7 +2070,7 @@
           <a:p>
             <a:fld id="{AC3A4DA2-F9D2-49C6-939E-AE8629D942AB}" type="datetimeFigureOut">
               <a:rPr lang="de-DE" smtClean="0"/>
-              <a:t>22.06.2020</a:t>
+              <a:t>24.06.2020</a:t>
             </a:fld>
             <a:endParaRPr lang="de-DE"/>
           </a:p>
@@ -2380,7 +2381,7 @@
           <a:p>
             <a:fld id="{AC3A4DA2-F9D2-49C6-939E-AE8629D942AB}" type="datetimeFigureOut">
               <a:rPr lang="de-DE" smtClean="0"/>
-              <a:t>22.06.2020</a:t>
+              <a:t>24.06.2020</a:t>
             </a:fld>
             <a:endParaRPr lang="de-DE"/>
           </a:p>
@@ -2668,7 +2669,7 @@
           <a:p>
             <a:fld id="{AC3A4DA2-F9D2-49C6-939E-AE8629D942AB}" type="datetimeFigureOut">
               <a:rPr lang="de-DE" smtClean="0"/>
-              <a:t>22.06.2020</a:t>
+              <a:t>24.06.2020</a:t>
             </a:fld>
             <a:endParaRPr lang="de-DE"/>
           </a:p>
@@ -2909,7 +2910,7 @@
           <a:p>
             <a:fld id="{AC3A4DA2-F9D2-49C6-939E-AE8629D942AB}" type="datetimeFigureOut">
               <a:rPr lang="de-DE" smtClean="0"/>
-              <a:t>22.06.2020</a:t>
+              <a:t>24.06.2020</a:t>
             </a:fld>
             <a:endParaRPr lang="de-DE"/>
           </a:p>
@@ -3312,6 +3313,124 @@
 <file path=ppt/slides/slide1.xml><?xml version="1.0" encoding="utf-8"?>
 <p:sld xmlns:a="http://schemas.openxmlformats.org/drawingml/2006/main" xmlns:r="http://schemas.openxmlformats.org/officeDocument/2006/relationships" xmlns:p="http://schemas.openxmlformats.org/presentationml/2006/main">
   <p:cSld>
+    <p:spTree>
+      <p:nvGrpSpPr>
+        <p:cNvPr id="1" name=""/>
+        <p:cNvGrpSpPr/>
+        <p:nvPr/>
+      </p:nvGrpSpPr>
+      <p:grpSpPr>
+        <a:xfrm>
+          <a:off x="0" y="0"/>
+          <a:ext cx="0" cy="0"/>
+          <a:chOff x="0" y="0"/>
+          <a:chExt cx="0" cy="0"/>
+        </a:xfrm>
+      </p:grpSpPr>
+      <p:pic>
+        <p:nvPicPr>
+          <p:cNvPr id="4" name="Grafik 3">
+            <a:extLst>
+              <a:ext uri="{FF2B5EF4-FFF2-40B4-BE49-F238E27FC236}">
+                <a16:creationId xmlns:a16="http://schemas.microsoft.com/office/drawing/2014/main" id="{DC97B557-3D8A-49CD-BB8A-D76B4FC3B2C0}"/>
+              </a:ext>
+            </a:extLst>
+          </p:cNvPr>
+          <p:cNvPicPr>
+            <a:picLocks noChangeAspect="1"/>
+          </p:cNvPicPr>
+          <p:nvPr/>
+        </p:nvPicPr>
+        <p:blipFill>
+          <a:blip r:embed="rId2"/>
+          <a:stretch>
+            <a:fillRect/>
+          </a:stretch>
+        </p:blipFill>
+        <p:spPr>
+          <a:xfrm>
+            <a:off x="7483053" y="0"/>
+            <a:ext cx="4703654" cy="6858000"/>
+          </a:xfrm>
+          <a:prstGeom prst="rect">
+            <a:avLst/>
+          </a:prstGeom>
+        </p:spPr>
+      </p:pic>
+      <p:sp>
+        <p:nvSpPr>
+          <p:cNvPr id="6" name="Textfeld 5">
+            <a:extLst>
+              <a:ext uri="{FF2B5EF4-FFF2-40B4-BE49-F238E27FC236}">
+                <a16:creationId xmlns:a16="http://schemas.microsoft.com/office/drawing/2014/main" id="{69D9CF3D-C777-4E57-8287-27A6CB3E2744}"/>
+              </a:ext>
+            </a:extLst>
+          </p:cNvPr>
+          <p:cNvSpPr txBox="1"/>
+          <p:nvPr/>
+        </p:nvSpPr>
+        <p:spPr>
+          <a:xfrm>
+            <a:off x="0" y="2787588"/>
+            <a:ext cx="7499985" cy="830997"/>
+          </a:xfrm>
+          <a:prstGeom prst="rect">
+            <a:avLst/>
+          </a:prstGeom>
+          <a:solidFill>
+            <a:schemeClr val="accent3">
+              <a:lumMod val="40000"/>
+              <a:lumOff val="60000"/>
+            </a:schemeClr>
+          </a:solidFill>
+        </p:spPr>
+        <p:txBody>
+          <a:bodyPr wrap="square" rtlCol="0">
+            <a:spAutoFit/>
+          </a:bodyPr>
+          <a:lstStyle/>
+          <a:p>
+            <a:pPr algn="ctr"/>
+            <a:r>
+              <a:rPr lang="en-US" sz="2400" b="1" dirty="0">
+                <a:latin typeface="Corbel" panose="020B0503020204020204" pitchFamily="34" charset="0"/>
+              </a:rPr>
+              <a:t>Creating a </a:t>
+            </a:r>
+            <a:r>
+              <a:rPr lang="en-US" sz="2400" b="1" dirty="0" err="1">
+                <a:latin typeface="Corbel" panose="020B0503020204020204" pitchFamily="34" charset="0"/>
+              </a:rPr>
+              <a:t>Geoheatmap</a:t>
+            </a:r>
+            <a:r>
+              <a:rPr lang="en-US" sz="2400" b="1" dirty="0">
+                <a:latin typeface="Corbel" panose="020B0503020204020204" pitchFamily="34" charset="0"/>
+              </a:rPr>
+              <a:t> using your google maps location history and folium</a:t>
+            </a:r>
+            <a:endParaRPr lang="de-DE" sz="2400" b="1" dirty="0">
+              <a:latin typeface="Corbel" panose="020B0503020204020204" pitchFamily="34" charset="0"/>
+            </a:endParaRPr>
+          </a:p>
+        </p:txBody>
+      </p:sp>
+    </p:spTree>
+    <p:extLst>
+      <p:ext uri="{BB962C8B-B14F-4D97-AF65-F5344CB8AC3E}">
+        <p14:creationId xmlns:p14="http://schemas.microsoft.com/office/powerpoint/2010/main" val="1295537005"/>
+      </p:ext>
+    </p:extLst>
+  </p:cSld>
+  <p:clrMapOvr>
+    <a:masterClrMapping/>
+  </p:clrMapOvr>
+</p:sld>
+</file>
+
+<file path=ppt/slides/slide2.xml><?xml version="1.0" encoding="utf-8"?>
+<p:sld xmlns:a="http://schemas.openxmlformats.org/drawingml/2006/main" xmlns:r="http://schemas.openxmlformats.org/officeDocument/2006/relationships" xmlns:p="http://schemas.openxmlformats.org/presentationml/2006/main">
+  <p:cSld>
     <p:bg>
       <p:bgPr>
         <a:solidFill>
@@ -3397,6 +3516,7 @@
           </a:bodyPr>
           <a:lstStyle/>
           <a:p>
+            <a:pPr algn="ctr"/>
             <a:r>
               <a:rPr lang="en-US" sz="2400" b="1" dirty="0">
                 <a:latin typeface="Corbel" panose="020B0503020204020204" pitchFamily="34" charset="0"/>
@@ -3451,12 +3571,8 @@
           <a:p>
             <a:pPr lvl="1"/>
             <a:r>
-              <a:rPr lang="de-DE" sz="1600" b="1" dirty="0" err="1"/>
-              <a:t>Aims</a:t>
-            </a:r>
-            <a:r>
               <a:rPr lang="de-DE" sz="1600" b="1" dirty="0"/>
-              <a:t>:</a:t>
+              <a:t>Tasks:</a:t>
             </a:r>
           </a:p>
           <a:p>

</xml_diff>

<commit_message>
changes in ppt and gitignore
</commit_message>
<xml_diff>
--- a/IntroductionGeoHeatmapLecture.pptx
+++ b/IntroductionGeoHeatmapLecture.pptx
@@ -3555,8 +3555,8 @@
         </p:nvSpPr>
         <p:spPr>
           <a:xfrm>
-            <a:off x="1" y="981923"/>
-            <a:ext cx="7483052" cy="5755422"/>
+            <a:off x="1" y="902021"/>
+            <a:ext cx="7483052" cy="5863144"/>
           </a:xfrm>
           <a:prstGeom prst="rect">
             <a:avLst/>
@@ -3571,13 +3571,13 @@
           <a:p>
             <a:pPr lvl="1"/>
             <a:r>
-              <a:rPr lang="de-DE" sz="1600" b="1" dirty="0"/>
+              <a:rPr lang="de-DE" sz="1500" b="1" dirty="0"/>
               <a:t>Tasks:</a:t>
             </a:r>
           </a:p>
           <a:p>
             <a:pPr lvl="1"/>
-            <a:endParaRPr lang="de-DE" sz="1600" b="1" dirty="0"/>
+            <a:endParaRPr lang="de-DE" sz="1500" b="1" dirty="0"/>
           </a:p>
           <a:p>
             <a:pPr marL="742950" lvl="1" indent="-285750">
@@ -3585,53 +3585,53 @@
               <a:buChar char="•"/>
             </a:pPr>
             <a:r>
-              <a:rPr lang="de-DE" sz="1600" dirty="0" err="1"/>
+              <a:rPr lang="de-DE" sz="1500" dirty="0" err="1"/>
               <a:t>Get</a:t>
             </a:r>
             <a:r>
-              <a:rPr lang="de-DE" sz="1600" dirty="0"/>
+              <a:rPr lang="de-DE" sz="1500" dirty="0"/>
               <a:t> all </a:t>
             </a:r>
             <a:r>
-              <a:rPr lang="de-DE" sz="1600" dirty="0" err="1"/>
+              <a:rPr lang="de-DE" sz="1500" dirty="0" err="1"/>
               <a:t>your</a:t>
             </a:r>
             <a:r>
-              <a:rPr lang="de-DE" sz="1600" dirty="0"/>
-              <a:t> </a:t>
-            </a:r>
-            <a:r>
-              <a:rPr lang="de-DE" sz="1600" dirty="0" err="1"/>
+              <a:rPr lang="de-DE" sz="1500" dirty="0"/>
+              <a:t> </a:t>
+            </a:r>
+            <a:r>
+              <a:rPr lang="de-DE" sz="1500" dirty="0" err="1"/>
               <a:t>data</a:t>
             </a:r>
             <a:r>
-              <a:rPr lang="de-DE" sz="1600" dirty="0"/>
-              <a:t> </a:t>
-            </a:r>
-            <a:r>
-              <a:rPr lang="de-DE" sz="1600" dirty="0" err="1"/>
+              <a:rPr lang="de-DE" sz="1500" dirty="0"/>
+              <a:t> </a:t>
+            </a:r>
+            <a:r>
+              <a:rPr lang="de-DE" sz="1500" dirty="0" err="1"/>
               <a:t>from</a:t>
             </a:r>
             <a:r>
-              <a:rPr lang="de-DE" sz="1600" dirty="0"/>
-              <a:t> </a:t>
-            </a:r>
-            <a:r>
-              <a:rPr lang="de-DE" sz="1600" dirty="0" err="1"/>
+              <a:rPr lang="de-DE" sz="1500" dirty="0"/>
+              <a:t> </a:t>
+            </a:r>
+            <a:r>
+              <a:rPr lang="de-DE" sz="1500" dirty="0" err="1"/>
               <a:t>google</a:t>
             </a:r>
             <a:r>
-              <a:rPr lang="de-DE" sz="1600" dirty="0"/>
+              <a:rPr lang="de-DE" sz="1500" dirty="0"/>
               <a:t> (</a:t>
             </a:r>
             <a:r>
-              <a:rPr lang="de-DE" sz="1600" dirty="0">
+              <a:rPr lang="de-DE" sz="1500" dirty="0">
                 <a:hlinkClick r:id="rId3"/>
               </a:rPr>
               <a:t>https://takeout.google.com</a:t>
             </a:r>
             <a:r>
-              <a:rPr lang="de-DE" sz="1600" dirty="0"/>
+              <a:rPr lang="de-DE" sz="1500" dirty="0"/>
               <a:t>).</a:t>
             </a:r>
           </a:p>
@@ -3640,7 +3640,7 @@
               <a:buFont typeface="Arial" panose="020B0604020202020204" pitchFamily="34" charset="0"/>
               <a:buChar char="•"/>
             </a:pPr>
-            <a:endParaRPr lang="de-DE" sz="1600" dirty="0"/>
+            <a:endParaRPr lang="de-DE" sz="1500" dirty="0"/>
           </a:p>
           <a:p>
             <a:pPr marL="742950" lvl="1" indent="-285750">
@@ -3648,63 +3648,63 @@
               <a:buChar char="•"/>
             </a:pPr>
             <a:r>
-              <a:rPr lang="de-DE" sz="1600" dirty="0"/>
+              <a:rPr lang="de-DE" sz="1500" dirty="0"/>
               <a:t>Handle JSON </a:t>
             </a:r>
             <a:r>
-              <a:rPr lang="de-DE" sz="1600" dirty="0" err="1"/>
+              <a:rPr lang="de-DE" sz="1500" dirty="0" err="1"/>
               <a:t>files</a:t>
             </a:r>
             <a:r>
-              <a:rPr lang="de-DE" sz="1600" dirty="0"/>
+              <a:rPr lang="de-DE" sz="1500" dirty="0"/>
               <a:t> (</a:t>
             </a:r>
             <a:r>
-              <a:rPr lang="de-DE" sz="1600" dirty="0" err="1"/>
+              <a:rPr lang="de-DE" sz="1500" dirty="0" err="1"/>
               <a:t>java</a:t>
             </a:r>
             <a:r>
-              <a:rPr lang="de-DE" sz="1600" dirty="0"/>
-              <a:t> </a:t>
-            </a:r>
-            <a:r>
-              <a:rPr lang="de-DE" sz="1600" dirty="0" err="1"/>
+              <a:rPr lang="de-DE" sz="1500" dirty="0"/>
+              <a:t> </a:t>
+            </a:r>
+            <a:r>
+              <a:rPr lang="de-DE" sz="1500" dirty="0" err="1"/>
               <a:t>script</a:t>
             </a:r>
             <a:r>
-              <a:rPr lang="de-DE" sz="1600" dirty="0"/>
-              <a:t> </a:t>
-            </a:r>
-            <a:r>
-              <a:rPr lang="de-DE" sz="1600" dirty="0" err="1"/>
+              <a:rPr lang="de-DE" sz="1500" dirty="0"/>
+              <a:t> </a:t>
+            </a:r>
+            <a:r>
+              <a:rPr lang="de-DE" sz="1500" dirty="0" err="1"/>
               <a:t>object</a:t>
             </a:r>
             <a:r>
-              <a:rPr lang="de-DE" sz="1600" dirty="0"/>
-              <a:t> </a:t>
-            </a:r>
-            <a:r>
-              <a:rPr lang="de-DE" sz="1600" dirty="0" err="1"/>
+              <a:rPr lang="de-DE" sz="1500" dirty="0"/>
+              <a:t> </a:t>
+            </a:r>
+            <a:r>
+              <a:rPr lang="de-DE" sz="1500" dirty="0" err="1"/>
               <a:t>notation</a:t>
             </a:r>
             <a:r>
-              <a:rPr lang="de-DE" sz="1600" dirty="0"/>
+              <a:rPr lang="de-DE" sz="1500" dirty="0"/>
               <a:t>) </a:t>
             </a:r>
             <a:r>
-              <a:rPr lang="de-DE" sz="1600" dirty="0" err="1"/>
+              <a:rPr lang="de-DE" sz="1500" dirty="0" err="1"/>
               <a:t>with</a:t>
             </a:r>
             <a:r>
-              <a:rPr lang="de-DE" sz="1600" dirty="0"/>
-              <a:t> </a:t>
-            </a:r>
-            <a:r>
-              <a:rPr lang="de-DE" sz="1600" dirty="0" err="1"/>
+              <a:rPr lang="de-DE" sz="1500" dirty="0"/>
+              <a:t> </a:t>
+            </a:r>
+            <a:r>
+              <a:rPr lang="de-DE" sz="1500" dirty="0" err="1"/>
               <a:t>python</a:t>
             </a:r>
             <a:r>
-              <a:rPr lang="de-DE" sz="1600" dirty="0"/>
+              <a:rPr lang="de-DE" sz="1500" dirty="0"/>
               <a:t>.</a:t>
             </a:r>
           </a:p>
@@ -3713,7 +3713,7 @@
               <a:buFont typeface="Arial" panose="020B0604020202020204" pitchFamily="34" charset="0"/>
               <a:buChar char="•"/>
             </a:pPr>
-            <a:endParaRPr lang="de-DE" sz="1600" dirty="0"/>
+            <a:endParaRPr lang="de-DE" sz="1500" dirty="0"/>
           </a:p>
           <a:p>
             <a:pPr marL="742950" lvl="1" indent="-285750">
@@ -3721,259 +3721,160 @@
               <a:buChar char="•"/>
             </a:pPr>
             <a:r>
-              <a:rPr lang="de-DE" sz="1600" dirty="0"/>
+              <a:rPr lang="de-DE" sz="1500" dirty="0"/>
               <a:t>Create a </a:t>
             </a:r>
             <a:r>
-              <a:rPr lang="de-DE" sz="1600" dirty="0" err="1"/>
+              <a:rPr lang="de-DE" sz="1500" dirty="0" err="1"/>
               <a:t>geoheatmap</a:t>
             </a:r>
             <a:r>
-              <a:rPr lang="de-DE" sz="1600" dirty="0"/>
-              <a:t> </a:t>
-            </a:r>
-            <a:r>
-              <a:rPr lang="de-DE" sz="1600" dirty="0" err="1"/>
+              <a:rPr lang="de-DE" sz="1500" dirty="0"/>
+              <a:t> </a:t>
+            </a:r>
+            <a:r>
+              <a:rPr lang="de-DE" sz="1500" dirty="0" err="1"/>
               <a:t>with</a:t>
             </a:r>
             <a:r>
-              <a:rPr lang="de-DE" sz="1600" dirty="0"/>
-              <a:t> </a:t>
-            </a:r>
-            <a:r>
-              <a:rPr lang="de-DE" sz="1600" dirty="0" err="1"/>
+              <a:rPr lang="de-DE" sz="1500" dirty="0"/>
+              <a:t> </a:t>
+            </a:r>
+            <a:r>
+              <a:rPr lang="de-DE" sz="1500" dirty="0" err="1"/>
               <a:t>the</a:t>
             </a:r>
             <a:r>
-              <a:rPr lang="de-DE" sz="1600" dirty="0"/>
-              <a:t> </a:t>
-            </a:r>
-            <a:r>
-              <a:rPr lang="de-DE" sz="1600" dirty="0" err="1"/>
+              <a:rPr lang="de-DE" sz="1500" dirty="0"/>
+              <a:t> </a:t>
+            </a:r>
+            <a:r>
+              <a:rPr lang="de-DE" sz="1500" dirty="0" err="1"/>
               <a:t>location</a:t>
             </a:r>
             <a:r>
-              <a:rPr lang="de-DE" sz="1600" dirty="0"/>
-              <a:t> </a:t>
-            </a:r>
-            <a:r>
-              <a:rPr lang="de-DE" sz="1600" dirty="0" err="1"/>
+              <a:rPr lang="de-DE" sz="1500" dirty="0"/>
+              <a:t> </a:t>
+            </a:r>
+            <a:r>
+              <a:rPr lang="de-DE" sz="1500" dirty="0" err="1"/>
               <a:t>history</a:t>
             </a:r>
             <a:r>
-              <a:rPr lang="de-DE" sz="1600" dirty="0"/>
-              <a:t> </a:t>
-            </a:r>
-            <a:r>
-              <a:rPr lang="de-DE" sz="1600" dirty="0" err="1"/>
+              <a:rPr lang="de-DE" sz="1500" dirty="0"/>
+              <a:t> </a:t>
+            </a:r>
+            <a:r>
+              <a:rPr lang="de-DE" sz="1500" dirty="0" err="1"/>
               <a:t>of</a:t>
             </a:r>
             <a:r>
-              <a:rPr lang="de-DE" sz="1600" dirty="0"/>
+              <a:rPr lang="de-DE" sz="1500" dirty="0"/>
               <a:t> a fake </a:t>
             </a:r>
             <a:r>
-              <a:rPr lang="de-DE" sz="1600" dirty="0" err="1"/>
+              <a:rPr lang="de-DE" sz="1500" dirty="0" err="1"/>
               <a:t>spiced</a:t>
             </a:r>
             <a:r>
-              <a:rPr lang="de-DE" sz="1600" dirty="0"/>
-              <a:t> </a:t>
-            </a:r>
-            <a:r>
-              <a:rPr lang="de-DE" sz="1600" dirty="0" err="1"/>
+              <a:rPr lang="de-DE" sz="1500" dirty="0"/>
+              <a:t> </a:t>
+            </a:r>
+            <a:r>
+              <a:rPr lang="de-DE" sz="1500" dirty="0" err="1"/>
               <a:t>student</a:t>
             </a:r>
             <a:r>
-              <a:rPr lang="de-DE" sz="1600" dirty="0"/>
+              <a:rPr lang="de-DE" sz="1500" dirty="0"/>
               <a:t> (</a:t>
             </a:r>
             <a:r>
-              <a:rPr lang="de-DE" sz="1600" dirty="0">
+              <a:rPr lang="de-DE" sz="1500" dirty="0">
                 <a:hlinkClick r:id="rId4"/>
               </a:rPr>
               <a:t>https://github.com/castillogo/Geo_heatmap</a:t>
             </a:r>
             <a:r>
-              <a:rPr lang="de-DE" sz="1600" dirty="0"/>
-              <a:t>) and save </a:t>
-            </a:r>
-            <a:r>
-              <a:rPr lang="de-DE" sz="1600" dirty="0" err="1"/>
-              <a:t>it</a:t>
-            </a:r>
-            <a:r>
-              <a:rPr lang="de-DE" sz="1600" dirty="0"/>
-              <a:t> </a:t>
-            </a:r>
-            <a:r>
-              <a:rPr lang="de-DE" sz="1600" dirty="0" err="1"/>
-              <a:t>as</a:t>
-            </a:r>
-            <a:r>
-              <a:rPr lang="de-DE" sz="1600" dirty="0"/>
-              <a:t> an </a:t>
-            </a:r>
-            <a:r>
-              <a:rPr lang="de-DE" sz="1600" dirty="0" err="1"/>
-              <a:t>html</a:t>
-            </a:r>
-            <a:r>
-              <a:rPr lang="de-DE" sz="1600" dirty="0"/>
-              <a:t> </a:t>
-            </a:r>
-            <a:r>
-              <a:rPr lang="de-DE" sz="1600" dirty="0" err="1"/>
-              <a:t>file</a:t>
-            </a:r>
-            <a:r>
-              <a:rPr lang="de-DE" sz="1600" dirty="0"/>
-              <a:t>.</a:t>
-            </a:r>
-          </a:p>
-          <a:p>
-            <a:pPr lvl="1"/>
-            <a:endParaRPr lang="de-DE" sz="1600" dirty="0"/>
+              <a:rPr lang="de-DE" sz="1500" dirty="0"/>
+              <a:t>).</a:t>
+            </a:r>
           </a:p>
           <a:p>
             <a:pPr marL="742950" lvl="1" indent="-285750">
               <a:buFont typeface="Arial" panose="020B0604020202020204" pitchFamily="34" charset="0"/>
               <a:buChar char="•"/>
             </a:pPr>
-            <a:r>
-              <a:rPr lang="de-DE" sz="1600" dirty="0"/>
-              <a:t>Guess all </a:t>
-            </a:r>
-            <a:r>
-              <a:rPr lang="de-DE" sz="1600" dirty="0" err="1"/>
-              <a:t>the</a:t>
-            </a:r>
-            <a:r>
-              <a:rPr lang="de-DE" sz="1600" dirty="0"/>
-              <a:t> </a:t>
-            </a:r>
-            <a:r>
-              <a:rPr lang="de-DE" sz="1600" dirty="0" err="1"/>
-              <a:t>places</a:t>
-            </a:r>
-            <a:r>
-              <a:rPr lang="de-DE" sz="1600" dirty="0"/>
-              <a:t> in Berlin </a:t>
-            </a:r>
-            <a:r>
-              <a:rPr lang="de-DE" sz="1600" dirty="0" err="1"/>
-              <a:t>where</a:t>
-            </a:r>
-            <a:r>
-              <a:rPr lang="de-DE" sz="1600" dirty="0"/>
-              <a:t> </a:t>
-            </a:r>
-            <a:r>
-              <a:rPr lang="de-DE" sz="1600" dirty="0" err="1"/>
-              <a:t>the</a:t>
-            </a:r>
-            <a:r>
-              <a:rPr lang="de-DE" sz="1600" dirty="0"/>
-              <a:t> fake </a:t>
-            </a:r>
-            <a:r>
-              <a:rPr lang="de-DE" sz="1600" dirty="0" err="1"/>
-              <a:t>spiced</a:t>
-            </a:r>
-            <a:r>
-              <a:rPr lang="de-DE" sz="1600" dirty="0"/>
-              <a:t> </a:t>
-            </a:r>
-            <a:r>
-              <a:rPr lang="de-DE" sz="1600" dirty="0" err="1"/>
-              <a:t>student</a:t>
-            </a:r>
-            <a:r>
-              <a:rPr lang="de-DE" sz="1600" dirty="0"/>
-              <a:t> </a:t>
-            </a:r>
-            <a:r>
-              <a:rPr lang="de-DE" sz="1600" dirty="0" err="1"/>
-              <a:t>has</a:t>
-            </a:r>
-            <a:r>
-              <a:rPr lang="de-DE" sz="1600" dirty="0"/>
-              <a:t> </a:t>
-            </a:r>
-            <a:r>
-              <a:rPr lang="de-DE" sz="1600" dirty="0" err="1"/>
-              <a:t>been</a:t>
-            </a:r>
-            <a:r>
-              <a:rPr lang="de-DE" sz="1600" dirty="0"/>
-              <a:t> and </a:t>
-            </a:r>
-            <a:r>
-              <a:rPr lang="de-DE" sz="1600" dirty="0" err="1"/>
-              <a:t>get</a:t>
-            </a:r>
-            <a:r>
-              <a:rPr lang="de-DE" sz="1600" dirty="0"/>
-              <a:t> a </a:t>
-            </a:r>
-            <a:r>
-              <a:rPr lang="de-DE" sz="1600" dirty="0" err="1"/>
-              <a:t>prize</a:t>
-            </a:r>
-            <a:r>
-              <a:rPr lang="de-DE" sz="1600" dirty="0"/>
-              <a:t>. </a:t>
-            </a:r>
-            <a:r>
-              <a:rPr lang="de-DE" sz="1600" b="1" dirty="0"/>
-              <a:t>;-) </a:t>
-            </a:r>
+            <a:endParaRPr lang="de-DE" sz="1500" dirty="0"/>
           </a:p>
           <a:p>
             <a:pPr marL="742950" lvl="1" indent="-285750">
               <a:buFont typeface="Arial" panose="020B0604020202020204" pitchFamily="34" charset="0"/>
               <a:buChar char="•"/>
             </a:pPr>
-            <a:endParaRPr lang="de-DE" sz="1600" dirty="0"/>
+            <a:r>
+              <a:rPr lang="de-DE" sz="1500" dirty="0"/>
+              <a:t>Turn </a:t>
+            </a:r>
+            <a:r>
+              <a:rPr lang="de-DE" sz="1500" dirty="0" err="1"/>
+              <a:t>the</a:t>
+            </a:r>
+            <a:r>
+              <a:rPr lang="de-DE" sz="1500" dirty="0"/>
+              <a:t> </a:t>
+            </a:r>
+            <a:r>
+              <a:rPr lang="de-DE" sz="1500" dirty="0" err="1"/>
+              <a:t>geoheatmap</a:t>
+            </a:r>
+            <a:r>
+              <a:rPr lang="de-DE" sz="1500" dirty="0"/>
+              <a:t> </a:t>
+            </a:r>
+            <a:r>
+              <a:rPr lang="de-DE" sz="1500" dirty="0" err="1"/>
+              <a:t>into</a:t>
+            </a:r>
+            <a:r>
+              <a:rPr lang="de-DE" sz="1500" dirty="0"/>
+              <a:t> a </a:t>
+            </a:r>
+            <a:r>
+              <a:rPr lang="de-DE" sz="1500" dirty="0" err="1"/>
+              <a:t>website</a:t>
+            </a:r>
+            <a:r>
+              <a:rPr lang="de-DE" sz="1500" dirty="0"/>
+              <a:t> </a:t>
+            </a:r>
+            <a:r>
+              <a:rPr lang="de-DE" sz="1500" dirty="0" err="1"/>
+              <a:t>available</a:t>
+            </a:r>
+            <a:r>
+              <a:rPr lang="de-DE" sz="1500" dirty="0"/>
+              <a:t> </a:t>
+            </a:r>
+            <a:r>
+              <a:rPr lang="de-DE" sz="1500" dirty="0" err="1"/>
+              <a:t>to</a:t>
+            </a:r>
+            <a:r>
+              <a:rPr lang="de-DE" sz="1500" dirty="0"/>
+              <a:t> </a:t>
+            </a:r>
+            <a:r>
+              <a:rPr lang="de-DE" sz="1500" dirty="0" err="1"/>
+              <a:t>everyone</a:t>
+            </a:r>
+            <a:r>
+              <a:rPr lang="de-DE" sz="1500" dirty="0"/>
+              <a:t>.</a:t>
+            </a:r>
           </a:p>
           <a:p>
             <a:pPr lvl="1"/>
-            <a:r>
-              <a:rPr lang="de-DE" sz="1600" b="1" dirty="0" err="1"/>
-              <a:t>Ideas</a:t>
-            </a:r>
-            <a:r>
-              <a:rPr lang="de-DE" sz="1600" b="1" dirty="0"/>
-              <a:t> </a:t>
-            </a:r>
-            <a:r>
-              <a:rPr lang="de-DE" sz="1600" b="1" dirty="0" err="1"/>
-              <a:t>for</a:t>
-            </a:r>
-            <a:r>
-              <a:rPr lang="de-DE" sz="1600" b="1" dirty="0"/>
-              <a:t> </a:t>
-            </a:r>
-            <a:r>
-              <a:rPr lang="de-DE" sz="1600" b="1" dirty="0" err="1"/>
-              <a:t>the</a:t>
-            </a:r>
-            <a:r>
-              <a:rPr lang="de-DE" sz="1600" b="1" dirty="0"/>
-              <a:t> </a:t>
-            </a:r>
-            <a:r>
-              <a:rPr lang="de-DE" sz="1600" b="1" dirty="0" err="1"/>
-              <a:t>future</a:t>
-            </a:r>
-            <a:r>
-              <a:rPr lang="de-DE" sz="1600" b="1" dirty="0"/>
-              <a:t>:</a:t>
-            </a:r>
-          </a:p>
-          <a:p>
-            <a:pPr lvl="1"/>
-            <a:endParaRPr lang="de-DE" sz="1600" b="1" dirty="0"/>
+            <a:endParaRPr lang="de-DE" sz="1500" dirty="0"/>
           </a:p>
           <a:p>
             <a:pPr marL="742950" lvl="1" indent="-285750">
@@ -3981,64 +3882,92 @@
               <a:buChar char="•"/>
             </a:pPr>
             <a:r>
-              <a:rPr lang="de-DE" sz="1600" dirty="0"/>
-              <a:t>Use </a:t>
-            </a:r>
-            <a:r>
-              <a:rPr lang="de-DE" sz="1600" dirty="0" err="1"/>
-              <a:t>your</a:t>
-            </a:r>
-            <a:r>
-              <a:rPr lang="de-DE" sz="1600" dirty="0"/>
-              <a:t> own </a:t>
-            </a:r>
-            <a:r>
-              <a:rPr lang="de-DE" sz="1600" dirty="0" err="1"/>
-              <a:t>geoheatmap</a:t>
-            </a:r>
-            <a:r>
-              <a:rPr lang="de-DE" sz="1600" dirty="0"/>
-              <a:t> </a:t>
-            </a:r>
-            <a:r>
-              <a:rPr lang="de-DE" sz="1600" dirty="0" err="1"/>
-              <a:t>to</a:t>
-            </a:r>
-            <a:r>
-              <a:rPr lang="de-DE" sz="1600" dirty="0"/>
-              <a:t> </a:t>
-            </a:r>
-            <a:r>
-              <a:rPr lang="de-DE" sz="1600" dirty="0" err="1"/>
-              <a:t>create</a:t>
-            </a:r>
-            <a:r>
-              <a:rPr lang="de-DE" sz="1600" dirty="0"/>
+              <a:rPr lang="de-DE" sz="1500" dirty="0"/>
+              <a:t>Guess all </a:t>
+            </a:r>
+            <a:r>
+              <a:rPr lang="de-DE" sz="1500" dirty="0" err="1"/>
+              <a:t>the</a:t>
+            </a:r>
+            <a:r>
+              <a:rPr lang="de-DE" sz="1500" dirty="0"/>
+              <a:t> </a:t>
+            </a:r>
+            <a:r>
+              <a:rPr lang="de-DE" sz="1500" dirty="0" err="1"/>
+              <a:t>places</a:t>
+            </a:r>
+            <a:r>
+              <a:rPr lang="de-DE" sz="1500" dirty="0"/>
+              <a:t> in Berlin </a:t>
+            </a:r>
+            <a:r>
+              <a:rPr lang="de-DE" sz="1500" dirty="0" err="1"/>
+              <a:t>where</a:t>
+            </a:r>
+            <a:r>
+              <a:rPr lang="de-DE" sz="1500" dirty="0"/>
+              <a:t> </a:t>
+            </a:r>
+            <a:r>
+              <a:rPr lang="de-DE" sz="1500" dirty="0" err="1"/>
+              <a:t>the</a:t>
+            </a:r>
+            <a:r>
+              <a:rPr lang="de-DE" sz="1500" dirty="0"/>
+              <a:t> fake </a:t>
+            </a:r>
+            <a:r>
+              <a:rPr lang="de-DE" sz="1500" dirty="0" err="1"/>
+              <a:t>spiced</a:t>
+            </a:r>
+            <a:r>
+              <a:rPr lang="de-DE" sz="1500" dirty="0"/>
+              <a:t> </a:t>
+            </a:r>
+            <a:r>
+              <a:rPr lang="de-DE" sz="1500" dirty="0" err="1"/>
+              <a:t>student</a:t>
+            </a:r>
+            <a:r>
+              <a:rPr lang="de-DE" sz="1500" dirty="0"/>
+              <a:t> </a:t>
+            </a:r>
+            <a:r>
+              <a:rPr lang="de-DE" sz="1500" dirty="0" err="1"/>
+              <a:t>has</a:t>
+            </a:r>
+            <a:r>
+              <a:rPr lang="de-DE" sz="1500" dirty="0"/>
+              <a:t> </a:t>
+            </a:r>
+            <a:r>
+              <a:rPr lang="de-DE" sz="1500" dirty="0" err="1"/>
+              <a:t>been</a:t>
+            </a:r>
+            <a:r>
+              <a:rPr lang="de-DE" sz="1500" dirty="0"/>
+              <a:t> and </a:t>
+            </a:r>
+            <a:r>
+              <a:rPr lang="de-DE" sz="1500" dirty="0" err="1"/>
+              <a:t>get</a:t>
+            </a:r>
+            <a:r>
+              <a:rPr lang="de-DE" sz="1500" dirty="0"/>
               <a:t> a </a:t>
             </a:r>
             <a:r>
-              <a:rPr lang="de-DE" sz="1600" dirty="0" err="1"/>
-              <a:t>dashboard</a:t>
-            </a:r>
-            <a:r>
-              <a:rPr lang="de-DE" sz="1600" dirty="0"/>
-              <a:t> </a:t>
-            </a:r>
-            <a:r>
-              <a:rPr lang="de-DE" sz="1600" dirty="0" err="1"/>
-              <a:t>about</a:t>
-            </a:r>
-            <a:r>
-              <a:rPr lang="de-DE" sz="1600" dirty="0"/>
-              <a:t> </a:t>
-            </a:r>
-            <a:r>
-              <a:rPr lang="de-DE" sz="1600" dirty="0" err="1"/>
-              <a:t>yourself</a:t>
-            </a:r>
-            <a:r>
-              <a:rPr lang="de-DE" sz="1600" dirty="0"/>
-              <a:t>?</a:t>
+              <a:rPr lang="de-DE" sz="1500" dirty="0" err="1"/>
+              <a:t>prize</a:t>
+            </a:r>
+            <a:r>
+              <a:rPr lang="de-DE" sz="1500" dirty="0"/>
+              <a:t>. </a:t>
+            </a:r>
+            <a:r>
+              <a:rPr lang="de-DE" sz="1500" b="1" dirty="0"/>
+              <a:t>;-) </a:t>
             </a:r>
           </a:p>
           <a:p>
@@ -4046,7 +3975,46 @@
               <a:buFont typeface="Arial" panose="020B0604020202020204" pitchFamily="34" charset="0"/>
               <a:buChar char="•"/>
             </a:pPr>
-            <a:endParaRPr lang="de-DE" sz="1600" dirty="0"/>
+            <a:endParaRPr lang="de-DE" sz="1500" dirty="0"/>
+          </a:p>
+          <a:p>
+            <a:pPr lvl="1"/>
+            <a:r>
+              <a:rPr lang="de-DE" sz="1500" b="1" dirty="0" err="1"/>
+              <a:t>Ideas</a:t>
+            </a:r>
+            <a:r>
+              <a:rPr lang="de-DE" sz="1500" b="1" dirty="0"/>
+              <a:t> </a:t>
+            </a:r>
+            <a:r>
+              <a:rPr lang="de-DE" sz="1500" b="1" dirty="0" err="1"/>
+              <a:t>for</a:t>
+            </a:r>
+            <a:r>
+              <a:rPr lang="de-DE" sz="1500" b="1" dirty="0"/>
+              <a:t> </a:t>
+            </a:r>
+            <a:r>
+              <a:rPr lang="de-DE" sz="1500" b="1" dirty="0" err="1"/>
+              <a:t>the</a:t>
+            </a:r>
+            <a:r>
+              <a:rPr lang="de-DE" sz="1500" b="1" dirty="0"/>
+              <a:t> </a:t>
+            </a:r>
+            <a:r>
+              <a:rPr lang="de-DE" sz="1500" b="1" dirty="0" err="1"/>
+              <a:t>future</a:t>
+            </a:r>
+            <a:r>
+              <a:rPr lang="de-DE" sz="1500" b="1" dirty="0"/>
+              <a:t>:</a:t>
+            </a:r>
+          </a:p>
+          <a:p>
+            <a:pPr lvl="1"/>
+            <a:endParaRPr lang="de-DE" sz="1500" b="1" dirty="0"/>
           </a:p>
           <a:p>
             <a:pPr marL="742950" lvl="1" indent="-285750">
@@ -4054,148 +4022,64 @@
               <a:buChar char="•"/>
             </a:pPr>
             <a:r>
-              <a:rPr lang="de-DE" sz="1600" dirty="0" err="1"/>
-              <a:t>Complete</a:t>
-            </a:r>
-            <a:r>
-              <a:rPr lang="de-DE" sz="1600" dirty="0"/>
-              <a:t> </a:t>
-            </a:r>
-            <a:r>
-              <a:rPr lang="de-DE" sz="1600" dirty="0" err="1"/>
-              <a:t>the</a:t>
-            </a:r>
-            <a:r>
-              <a:rPr lang="de-DE" sz="1600" dirty="0"/>
-              <a:t> </a:t>
-            </a:r>
-            <a:r>
-              <a:rPr lang="de-DE" sz="1600" dirty="0" err="1"/>
-              <a:t>dashborad</a:t>
-            </a:r>
-            <a:r>
-              <a:rPr lang="de-DE" sz="1600" dirty="0"/>
-              <a:t> </a:t>
-            </a:r>
-            <a:r>
-              <a:rPr lang="de-DE" sz="1600" dirty="0" err="1"/>
-              <a:t>with</a:t>
-            </a:r>
-            <a:r>
-              <a:rPr lang="de-DE" sz="1600" dirty="0"/>
-              <a:t> </a:t>
-            </a:r>
-            <a:r>
-              <a:rPr lang="de-DE" sz="1600" dirty="0" err="1"/>
-              <a:t>the</a:t>
-            </a:r>
-            <a:r>
-              <a:rPr lang="de-DE" sz="1600" dirty="0"/>
-              <a:t> </a:t>
-            </a:r>
-            <a:r>
-              <a:rPr lang="de-DE" sz="1600" dirty="0" err="1"/>
-              <a:t>rest</a:t>
-            </a:r>
-            <a:r>
-              <a:rPr lang="de-DE" sz="1600" dirty="0"/>
-              <a:t> </a:t>
-            </a:r>
-            <a:r>
-              <a:rPr lang="de-DE" sz="1600" dirty="0" err="1"/>
-              <a:t>of</a:t>
-            </a:r>
-            <a:r>
-              <a:rPr lang="de-DE" sz="1600" dirty="0"/>
-              <a:t> </a:t>
-            </a:r>
-            <a:r>
-              <a:rPr lang="de-DE" sz="1600" dirty="0" err="1"/>
-              <a:t>the</a:t>
-            </a:r>
-            <a:r>
-              <a:rPr lang="de-DE" sz="1600" dirty="0"/>
-              <a:t> </a:t>
-            </a:r>
-            <a:r>
-              <a:rPr lang="de-DE" sz="1600" dirty="0" err="1"/>
-              <a:t>data</a:t>
-            </a:r>
-            <a:r>
-              <a:rPr lang="de-DE" sz="1600" dirty="0"/>
-              <a:t> </a:t>
-            </a:r>
-            <a:r>
-              <a:rPr lang="de-DE" sz="1600" dirty="0" err="1"/>
-              <a:t>you</a:t>
-            </a:r>
-            <a:r>
-              <a:rPr lang="de-DE" sz="1600" dirty="0"/>
-              <a:t> </a:t>
-            </a:r>
-            <a:r>
-              <a:rPr lang="de-DE" sz="1600" dirty="0" err="1"/>
-              <a:t>get</a:t>
-            </a:r>
-            <a:r>
-              <a:rPr lang="de-DE" sz="1600" dirty="0"/>
-              <a:t> </a:t>
-            </a:r>
-            <a:r>
-              <a:rPr lang="de-DE" sz="1600" dirty="0" err="1"/>
-              <a:t>from</a:t>
-            </a:r>
-            <a:r>
-              <a:rPr lang="de-DE" sz="1600" dirty="0"/>
-              <a:t> </a:t>
-            </a:r>
-            <a:r>
-              <a:rPr lang="de-DE" sz="1600" dirty="0" err="1"/>
-              <a:t>google</a:t>
-            </a:r>
-            <a:r>
-              <a:rPr lang="de-DE" sz="1600" dirty="0"/>
-              <a:t>? (</a:t>
-            </a:r>
-            <a:r>
-              <a:rPr lang="de-DE" sz="1600" dirty="0" err="1"/>
-              <a:t>youtube</a:t>
-            </a:r>
-            <a:r>
-              <a:rPr lang="de-DE" sz="1600" dirty="0"/>
-              <a:t> </a:t>
-            </a:r>
-            <a:r>
-              <a:rPr lang="de-DE" sz="1600" dirty="0" err="1"/>
-              <a:t>history</a:t>
-            </a:r>
-            <a:r>
-              <a:rPr lang="de-DE" sz="1600" dirty="0"/>
-              <a:t>, </a:t>
-            </a:r>
-            <a:r>
-              <a:rPr lang="de-DE" sz="1600" dirty="0" err="1"/>
-              <a:t>google</a:t>
-            </a:r>
-            <a:r>
-              <a:rPr lang="de-DE" sz="1600" dirty="0"/>
-              <a:t> </a:t>
-            </a:r>
-            <a:r>
-              <a:rPr lang="de-DE" sz="1600" dirty="0" err="1"/>
-              <a:t>search</a:t>
-            </a:r>
-            <a:r>
-              <a:rPr lang="de-DE" sz="1600" dirty="0"/>
-              <a:t> </a:t>
-            </a:r>
-            <a:r>
-              <a:rPr lang="de-DE" sz="1600" dirty="0" err="1"/>
-              <a:t>history</a:t>
-            </a:r>
-            <a:r>
-              <a:rPr lang="de-DE" sz="1600" dirty="0"/>
-              <a:t>, etc…)</a:t>
+              <a:rPr lang="de-DE" sz="1500" dirty="0"/>
+              <a:t>Use </a:t>
+            </a:r>
+            <a:r>
+              <a:rPr lang="de-DE" sz="1500" dirty="0" err="1"/>
+              <a:t>your</a:t>
+            </a:r>
+            <a:r>
+              <a:rPr lang="de-DE" sz="1500" dirty="0"/>
+              <a:t> own </a:t>
+            </a:r>
+            <a:r>
+              <a:rPr lang="de-DE" sz="1500" dirty="0" err="1"/>
+              <a:t>map</a:t>
+            </a:r>
+            <a:r>
+              <a:rPr lang="de-DE" sz="1500" dirty="0"/>
+              <a:t> </a:t>
+            </a:r>
+            <a:r>
+              <a:rPr lang="de-DE" sz="1500" dirty="0" err="1"/>
+              <a:t>to</a:t>
+            </a:r>
+            <a:r>
+              <a:rPr lang="de-DE" sz="1500" dirty="0"/>
+              <a:t> </a:t>
+            </a:r>
+            <a:r>
+              <a:rPr lang="de-DE" sz="1500" dirty="0" err="1"/>
+              <a:t>create</a:t>
+            </a:r>
+            <a:r>
+              <a:rPr lang="de-DE" sz="1500" dirty="0"/>
+              <a:t> a </a:t>
+            </a:r>
+            <a:r>
+              <a:rPr lang="de-DE" sz="1500" dirty="0" err="1"/>
+              <a:t>dashboard</a:t>
+            </a:r>
+            <a:r>
+              <a:rPr lang="de-DE" sz="1500" dirty="0"/>
+              <a:t> </a:t>
+            </a:r>
+            <a:r>
+              <a:rPr lang="de-DE" sz="1500" dirty="0" err="1"/>
+              <a:t>about</a:t>
+            </a:r>
+            <a:r>
+              <a:rPr lang="de-DE" sz="1500" dirty="0"/>
+              <a:t> </a:t>
+            </a:r>
+            <a:r>
+              <a:rPr lang="de-DE" sz="1500" dirty="0" err="1"/>
+              <a:t>yourself</a:t>
+            </a:r>
+            <a:r>
+              <a:rPr lang="de-DE" sz="1500" dirty="0"/>
+              <a:t>?</a:t>
             </a:r>
           </a:p>
           <a:p>
@@ -4203,7 +4087,7 @@
               <a:buFont typeface="Arial" panose="020B0604020202020204" pitchFamily="34" charset="0"/>
               <a:buChar char="•"/>
             </a:pPr>
-            <a:endParaRPr lang="de-DE" sz="1600" dirty="0"/>
+            <a:endParaRPr lang="de-DE" sz="1500" dirty="0"/>
           </a:p>
           <a:p>
             <a:pPr marL="742950" lvl="1" indent="-285750">
@@ -4211,102 +4095,148 @@
               <a:buChar char="•"/>
             </a:pPr>
             <a:r>
-              <a:rPr lang="de-DE" sz="1600" dirty="0" err="1"/>
-              <a:t>Or</a:t>
-            </a:r>
-            <a:r>
-              <a:rPr lang="de-DE" sz="1600" dirty="0"/>
-              <a:t> </a:t>
-            </a:r>
-            <a:r>
-              <a:rPr lang="de-DE" sz="1600" dirty="0" err="1"/>
-              <a:t>use</a:t>
-            </a:r>
-            <a:r>
-              <a:rPr lang="de-DE" sz="1600" dirty="0"/>
-              <a:t> </a:t>
-            </a:r>
-            <a:r>
-              <a:rPr lang="de-DE" sz="1600" dirty="0" err="1"/>
-              <a:t>current</a:t>
-            </a:r>
-            <a:r>
-              <a:rPr lang="de-DE" sz="1600" dirty="0"/>
-              <a:t> </a:t>
-            </a:r>
-            <a:r>
-              <a:rPr lang="de-DE" sz="1600" dirty="0" err="1"/>
-              <a:t>capital</a:t>
-            </a:r>
-            <a:r>
-              <a:rPr lang="de-DE" sz="1600" dirty="0"/>
-              <a:t> </a:t>
-            </a:r>
-            <a:r>
-              <a:rPr lang="de-DE" sz="1600" dirty="0" err="1"/>
-              <a:t>bikeshare</a:t>
-            </a:r>
-            <a:r>
-              <a:rPr lang="de-DE" sz="1600" dirty="0"/>
-              <a:t> </a:t>
-            </a:r>
-            <a:r>
-              <a:rPr lang="de-DE" sz="1600" dirty="0" err="1"/>
-              <a:t>location</a:t>
-            </a:r>
-            <a:r>
-              <a:rPr lang="de-DE" sz="1600" dirty="0"/>
-              <a:t> and time </a:t>
-            </a:r>
-            <a:r>
-              <a:rPr lang="de-DE" sz="1600" dirty="0" err="1"/>
+              <a:rPr lang="de-DE" sz="1500" dirty="0" err="1"/>
+              <a:t>Complete</a:t>
+            </a:r>
+            <a:r>
+              <a:rPr lang="de-DE" sz="1500" dirty="0"/>
+              <a:t> </a:t>
+            </a:r>
+            <a:r>
+              <a:rPr lang="de-DE" sz="1500" dirty="0" err="1"/>
+              <a:t>the</a:t>
+            </a:r>
+            <a:r>
+              <a:rPr lang="de-DE" sz="1500" dirty="0"/>
+              <a:t> </a:t>
+            </a:r>
+            <a:r>
+              <a:rPr lang="de-DE" sz="1500" dirty="0" err="1"/>
+              <a:t>dashborad</a:t>
+            </a:r>
+            <a:r>
+              <a:rPr lang="de-DE" sz="1500" dirty="0"/>
+              <a:t> </a:t>
+            </a:r>
+            <a:r>
+              <a:rPr lang="de-DE" sz="1500" dirty="0" err="1"/>
+              <a:t>with</a:t>
+            </a:r>
+            <a:r>
+              <a:rPr lang="de-DE" sz="1500" dirty="0"/>
+              <a:t> </a:t>
+            </a:r>
+            <a:r>
+              <a:rPr lang="de-DE" sz="1500" dirty="0" err="1"/>
+              <a:t>the</a:t>
+            </a:r>
+            <a:r>
+              <a:rPr lang="de-DE" sz="1500" dirty="0"/>
+              <a:t> </a:t>
+            </a:r>
+            <a:r>
+              <a:rPr lang="de-DE" sz="1500" dirty="0" err="1"/>
+              <a:t>rest</a:t>
+            </a:r>
+            <a:r>
+              <a:rPr lang="de-DE" sz="1500" dirty="0"/>
+              <a:t> </a:t>
+            </a:r>
+            <a:r>
+              <a:rPr lang="de-DE" sz="1500" dirty="0" err="1"/>
+              <a:t>of</a:t>
+            </a:r>
+            <a:r>
+              <a:rPr lang="de-DE" sz="1500" dirty="0"/>
+              <a:t> </a:t>
+            </a:r>
+            <a:r>
+              <a:rPr lang="de-DE" sz="1500" dirty="0" err="1"/>
+              <a:t>the</a:t>
+            </a:r>
+            <a:r>
+              <a:rPr lang="de-DE" sz="1500" dirty="0"/>
+              <a:t> </a:t>
+            </a:r>
+            <a:r>
+              <a:rPr lang="de-DE" sz="1500" dirty="0" err="1"/>
               <a:t>data</a:t>
             </a:r>
             <a:r>
-              <a:rPr lang="de-DE" sz="1600" dirty="0"/>
-              <a:t> and </a:t>
-            </a:r>
-            <a:r>
-              <a:rPr lang="de-DE" sz="1600" dirty="0" err="1"/>
-              <a:t>for</a:t>
-            </a:r>
-            <a:r>
-              <a:rPr lang="de-DE" sz="1600" dirty="0"/>
-              <a:t> </a:t>
-            </a:r>
-            <a:r>
-              <a:rPr lang="de-DE" sz="1600" dirty="0" err="1"/>
-              <a:t>the</a:t>
-            </a:r>
-            <a:r>
-              <a:rPr lang="de-DE" sz="1600" dirty="0"/>
-              <a:t> </a:t>
-            </a:r>
-            <a:r>
-              <a:rPr lang="de-DE" sz="1600" dirty="0" err="1"/>
-              <a:t>heatmap</a:t>
-            </a:r>
-            <a:r>
-              <a:rPr lang="de-DE" sz="1600" dirty="0"/>
-              <a:t> and </a:t>
-            </a:r>
-            <a:r>
-              <a:rPr lang="de-DE" sz="1600" dirty="0" err="1"/>
-              <a:t>dashboard</a:t>
-            </a:r>
-            <a:r>
-              <a:rPr lang="de-DE" sz="1600" dirty="0"/>
+              <a:rPr lang="de-DE" sz="1500" dirty="0"/>
+              <a:t> </a:t>
+            </a:r>
+            <a:r>
+              <a:rPr lang="de-DE" sz="1500" dirty="0" err="1"/>
+              <a:t>you</a:t>
+            </a:r>
+            <a:r>
+              <a:rPr lang="de-DE" sz="1500" dirty="0"/>
+              <a:t> </a:t>
+            </a:r>
+            <a:r>
+              <a:rPr lang="de-DE" sz="1500" dirty="0" err="1"/>
+              <a:t>get</a:t>
+            </a:r>
+            <a:r>
+              <a:rPr lang="de-DE" sz="1500" dirty="0"/>
+              <a:t> </a:t>
+            </a:r>
+            <a:r>
+              <a:rPr lang="de-DE" sz="1500" dirty="0" err="1"/>
+              <a:t>from</a:t>
+            </a:r>
+            <a:r>
+              <a:rPr lang="de-DE" sz="1500" dirty="0"/>
+              <a:t> </a:t>
+            </a:r>
+            <a:r>
+              <a:rPr lang="de-DE" sz="1500" dirty="0" err="1"/>
+              <a:t>google</a:t>
+            </a:r>
+            <a:r>
+              <a:rPr lang="de-DE" sz="1500" dirty="0"/>
               <a:t>? (</a:t>
             </a:r>
             <a:r>
-              <a:rPr lang="de-DE" sz="1600" dirty="0">
-                <a:hlinkClick r:id="rId5" invalidUrl="https:///"/>
-              </a:rPr>
-              <a:t>https://gbfs.capitalbikeshare.com/gbfs/gbfs.json</a:t>
-            </a:r>
-            <a:r>
-              <a:rPr lang="de-DE" sz="1600" dirty="0"/>
-              <a:t>).</a:t>
+              <a:rPr lang="de-DE" sz="1500" dirty="0" err="1"/>
+              <a:t>youtube</a:t>
+            </a:r>
+            <a:r>
+              <a:rPr lang="de-DE" sz="1500" dirty="0"/>
+              <a:t> </a:t>
+            </a:r>
+            <a:r>
+              <a:rPr lang="de-DE" sz="1500" dirty="0" err="1"/>
+              <a:t>history</a:t>
+            </a:r>
+            <a:r>
+              <a:rPr lang="de-DE" sz="1500" dirty="0"/>
+              <a:t>, </a:t>
+            </a:r>
+            <a:r>
+              <a:rPr lang="de-DE" sz="1500" dirty="0" err="1"/>
+              <a:t>google</a:t>
+            </a:r>
+            <a:r>
+              <a:rPr lang="de-DE" sz="1500" dirty="0"/>
+              <a:t> </a:t>
+            </a:r>
+            <a:r>
+              <a:rPr lang="de-DE" sz="1500" dirty="0" err="1"/>
+              <a:t>search</a:t>
+            </a:r>
+            <a:r>
+              <a:rPr lang="de-DE" sz="1500" dirty="0"/>
+              <a:t> </a:t>
+            </a:r>
+            <a:r>
+              <a:rPr lang="de-DE" sz="1500" dirty="0" err="1"/>
+              <a:t>history</a:t>
+            </a:r>
+            <a:r>
+              <a:rPr lang="de-DE" sz="1500" dirty="0"/>
+              <a:t>, etc…)</a:t>
             </a:r>
           </a:p>
           <a:p>
@@ -4314,7 +4244,7 @@
               <a:buFont typeface="Arial" panose="020B0604020202020204" pitchFamily="34" charset="0"/>
               <a:buChar char="•"/>
             </a:pPr>
-            <a:endParaRPr lang="de-DE" sz="1600" dirty="0"/>
+            <a:endParaRPr lang="de-DE" sz="1500" dirty="0"/>
           </a:p>
           <a:p>
             <a:pPr marL="742950" lvl="1" indent="-285750">
@@ -4322,62 +4252,185 @@
               <a:buChar char="•"/>
             </a:pPr>
             <a:r>
-              <a:rPr lang="de-DE" sz="1600" dirty="0" err="1"/>
+              <a:rPr lang="de-DE" sz="1500" dirty="0" err="1"/>
+              <a:t>Or</a:t>
+            </a:r>
+            <a:r>
+              <a:rPr lang="de-DE" sz="1500" dirty="0"/>
+              <a:t> </a:t>
+            </a:r>
+            <a:r>
+              <a:rPr lang="de-DE" sz="1500" dirty="0" err="1"/>
+              <a:t>use</a:t>
+            </a:r>
+            <a:r>
+              <a:rPr lang="de-DE" sz="1500" dirty="0"/>
+              <a:t> </a:t>
+            </a:r>
+            <a:r>
+              <a:rPr lang="de-DE" sz="1500" dirty="0" err="1"/>
+              <a:t>current</a:t>
+            </a:r>
+            <a:r>
+              <a:rPr lang="de-DE" sz="1500" dirty="0"/>
+              <a:t> </a:t>
+            </a:r>
+            <a:r>
+              <a:rPr lang="de-DE" sz="1500" dirty="0" err="1"/>
+              <a:t>capital</a:t>
+            </a:r>
+            <a:r>
+              <a:rPr lang="de-DE" sz="1500" dirty="0"/>
+              <a:t> </a:t>
+            </a:r>
+            <a:r>
+              <a:rPr lang="de-DE" sz="1500" dirty="0" err="1"/>
+              <a:t>bikeshare</a:t>
+            </a:r>
+            <a:r>
+              <a:rPr lang="de-DE" sz="1500" dirty="0"/>
+              <a:t> </a:t>
+            </a:r>
+            <a:r>
+              <a:rPr lang="de-DE" sz="1500" dirty="0" err="1"/>
+              <a:t>location</a:t>
+            </a:r>
+            <a:r>
+              <a:rPr lang="de-DE" sz="1500" dirty="0"/>
+              <a:t> and time </a:t>
+            </a:r>
+            <a:r>
+              <a:rPr lang="de-DE" sz="1500" dirty="0" err="1"/>
+              <a:t>data</a:t>
+            </a:r>
+            <a:r>
+              <a:rPr lang="de-DE" sz="1500" dirty="0"/>
+              <a:t> and </a:t>
+            </a:r>
+            <a:r>
+              <a:rPr lang="de-DE" sz="1500" dirty="0" err="1"/>
+              <a:t>for</a:t>
+            </a:r>
+            <a:r>
+              <a:rPr lang="de-DE" sz="1500" dirty="0"/>
+              <a:t> </a:t>
+            </a:r>
+            <a:r>
+              <a:rPr lang="de-DE" sz="1500" dirty="0" err="1"/>
+              <a:t>the</a:t>
+            </a:r>
+            <a:r>
+              <a:rPr lang="de-DE" sz="1500" dirty="0"/>
+              <a:t> </a:t>
+            </a:r>
+            <a:r>
+              <a:rPr lang="de-DE" sz="1500" dirty="0" err="1"/>
+              <a:t>heatmap</a:t>
+            </a:r>
+            <a:r>
+              <a:rPr lang="de-DE" sz="1500" dirty="0"/>
+              <a:t> and </a:t>
+            </a:r>
+            <a:r>
+              <a:rPr lang="de-DE" sz="1500" dirty="0" err="1"/>
+              <a:t>dashboard</a:t>
+            </a:r>
+            <a:r>
+              <a:rPr lang="de-DE" sz="1500" dirty="0"/>
+              <a:t>? (</a:t>
+            </a:r>
+            <a:r>
+              <a:rPr lang="de-DE" sz="1500" dirty="0">
+                <a:hlinkClick r:id="rId5" invalidUrl="https:///"/>
+              </a:rPr>
+              <a:t>https://gbfs.capitalbikeshare.com/gbfs/gbfs.json</a:t>
+            </a:r>
+            <a:r>
+              <a:rPr lang="de-DE" sz="1500" dirty="0"/>
+              <a:t>).</a:t>
+            </a:r>
+          </a:p>
+          <a:p>
+            <a:pPr marL="742950" lvl="1" indent="-285750">
+              <a:buFont typeface="Arial" panose="020B0604020202020204" pitchFamily="34" charset="0"/>
+              <a:buChar char="•"/>
+            </a:pPr>
+            <a:endParaRPr lang="de-DE" sz="1500" dirty="0"/>
+          </a:p>
+          <a:p>
+            <a:pPr marL="742950" lvl="1" indent="-285750">
+              <a:buFont typeface="Arial" panose="020B0604020202020204" pitchFamily="34" charset="0"/>
+              <a:buChar char="•"/>
+            </a:pPr>
+            <a:r>
+              <a:rPr lang="de-DE" sz="1500" dirty="0" err="1"/>
               <a:t>What</a:t>
             </a:r>
             <a:r>
-              <a:rPr lang="de-DE" sz="1600" dirty="0"/>
-              <a:t> </a:t>
-            </a:r>
-            <a:r>
-              <a:rPr lang="de-DE" sz="1600" dirty="0" err="1"/>
+              <a:rPr lang="de-DE" sz="1500" dirty="0"/>
+              <a:t> </a:t>
+            </a:r>
+            <a:r>
+              <a:rPr lang="de-DE" sz="1500" dirty="0" err="1"/>
               <a:t>about</a:t>
             </a:r>
             <a:r>
-              <a:rPr lang="de-DE" sz="1600" dirty="0"/>
+              <a:rPr lang="de-DE" sz="1500" dirty="0"/>
               <a:t> a </a:t>
             </a:r>
             <a:r>
-              <a:rPr lang="de-DE" sz="1600" dirty="0" err="1"/>
+              <a:rPr lang="de-DE" sz="1500" dirty="0" err="1"/>
               <a:t>heatmap</a:t>
             </a:r>
             <a:r>
-              <a:rPr lang="de-DE" sz="1600" dirty="0"/>
-              <a:t> </a:t>
-            </a:r>
-            <a:r>
-              <a:rPr lang="de-DE" sz="1600" dirty="0" err="1"/>
+              <a:rPr lang="de-DE" sz="1500" dirty="0"/>
+              <a:t> </a:t>
+            </a:r>
+            <a:r>
+              <a:rPr lang="de-DE" sz="1500" dirty="0" err="1"/>
               <a:t>of</a:t>
             </a:r>
             <a:r>
-              <a:rPr lang="de-DE" sz="1600" dirty="0"/>
-              <a:t> </a:t>
-            </a:r>
-            <a:r>
-              <a:rPr lang="de-DE" sz="1600" dirty="0" err="1"/>
+              <a:rPr lang="de-DE" sz="1500" dirty="0"/>
+              <a:t> </a:t>
+            </a:r>
+            <a:r>
+              <a:rPr lang="de-DE" sz="1500" dirty="0" err="1"/>
               <a:t>airline</a:t>
             </a:r>
             <a:r>
-              <a:rPr lang="de-DE" sz="1600" dirty="0"/>
-              <a:t> </a:t>
-            </a:r>
-            <a:r>
-              <a:rPr lang="de-DE" sz="1600" dirty="0" err="1"/>
+              <a:rPr lang="de-DE" sz="1500" dirty="0"/>
+              <a:t> </a:t>
+            </a:r>
+            <a:r>
+              <a:rPr lang="de-DE" sz="1500" dirty="0" err="1"/>
               <a:t>traffic</a:t>
             </a:r>
             <a:r>
-              <a:rPr lang="de-DE" sz="1600" dirty="0"/>
+              <a:rPr lang="de-DE" sz="1500" dirty="0"/>
               <a:t>? (</a:t>
             </a:r>
             <a:r>
-              <a:rPr lang="de-DE" sz="1600" dirty="0">
+              <a:rPr lang="de-DE" sz="1500" dirty="0">
                 <a:hlinkClick r:id="rId6"/>
               </a:rPr>
               <a:t>https://aviation-edge.com</a:t>
             </a:r>
             <a:r>
-              <a:rPr lang="de-DE" sz="1600" dirty="0"/>
-              <a:t>) $$$!!!</a:t>
+              <a:rPr lang="de-DE" sz="1500" dirty="0"/>
+              <a:t>) (</a:t>
+            </a:r>
+            <a:r>
+              <a:rPr lang="de-DE" sz="1500" dirty="0">
+                <a:solidFill>
+                  <a:srgbClr val="FF0000"/>
+                </a:solidFill>
+              </a:rPr>
+              <a:t>$</a:t>
+            </a:r>
+            <a:r>
+              <a:rPr lang="de-DE" sz="1500" dirty="0"/>
+              <a:t>)</a:t>
             </a:r>
           </a:p>
         </p:txBody>

</xml_diff>

<commit_message>
changes in mapsearch file
</commit_message>
<xml_diff>
--- a/IntroductionGeoHeatmapLecture.pptx
+++ b/IntroductionGeoHeatmapLecture.pptx
@@ -260,7 +260,7 @@
           <a:p>
             <a:fld id="{AC3A4DA2-F9D2-49C6-939E-AE8629D942AB}" type="datetimeFigureOut">
               <a:rPr lang="de-DE" smtClean="0"/>
-              <a:t>24.06.2020</a:t>
+              <a:t>25.06.2020</a:t>
             </a:fld>
             <a:endParaRPr lang="de-DE"/>
           </a:p>
@@ -458,7 +458,7 @@
           <a:p>
             <a:fld id="{AC3A4DA2-F9D2-49C6-939E-AE8629D942AB}" type="datetimeFigureOut">
               <a:rPr lang="de-DE" smtClean="0"/>
-              <a:t>24.06.2020</a:t>
+              <a:t>25.06.2020</a:t>
             </a:fld>
             <a:endParaRPr lang="de-DE"/>
           </a:p>
@@ -666,7 +666,7 @@
           <a:p>
             <a:fld id="{AC3A4DA2-F9D2-49C6-939E-AE8629D942AB}" type="datetimeFigureOut">
               <a:rPr lang="de-DE" smtClean="0"/>
-              <a:t>24.06.2020</a:t>
+              <a:t>25.06.2020</a:t>
             </a:fld>
             <a:endParaRPr lang="de-DE"/>
           </a:p>
@@ -864,7 +864,7 @@
           <a:p>
             <a:fld id="{AC3A4DA2-F9D2-49C6-939E-AE8629D942AB}" type="datetimeFigureOut">
               <a:rPr lang="de-DE" smtClean="0"/>
-              <a:t>24.06.2020</a:t>
+              <a:t>25.06.2020</a:t>
             </a:fld>
             <a:endParaRPr lang="de-DE"/>
           </a:p>
@@ -1139,7 +1139,7 @@
           <a:p>
             <a:fld id="{AC3A4DA2-F9D2-49C6-939E-AE8629D942AB}" type="datetimeFigureOut">
               <a:rPr lang="de-DE" smtClean="0"/>
-              <a:t>24.06.2020</a:t>
+              <a:t>25.06.2020</a:t>
             </a:fld>
             <a:endParaRPr lang="de-DE"/>
           </a:p>
@@ -1404,7 +1404,7 @@
           <a:p>
             <a:fld id="{AC3A4DA2-F9D2-49C6-939E-AE8629D942AB}" type="datetimeFigureOut">
               <a:rPr lang="de-DE" smtClean="0"/>
-              <a:t>24.06.2020</a:t>
+              <a:t>25.06.2020</a:t>
             </a:fld>
             <a:endParaRPr lang="de-DE"/>
           </a:p>
@@ -1816,7 +1816,7 @@
           <a:p>
             <a:fld id="{AC3A4DA2-F9D2-49C6-939E-AE8629D942AB}" type="datetimeFigureOut">
               <a:rPr lang="de-DE" smtClean="0"/>
-              <a:t>24.06.2020</a:t>
+              <a:t>25.06.2020</a:t>
             </a:fld>
             <a:endParaRPr lang="de-DE"/>
           </a:p>
@@ -1957,7 +1957,7 @@
           <a:p>
             <a:fld id="{AC3A4DA2-F9D2-49C6-939E-AE8629D942AB}" type="datetimeFigureOut">
               <a:rPr lang="de-DE" smtClean="0"/>
-              <a:t>24.06.2020</a:t>
+              <a:t>25.06.2020</a:t>
             </a:fld>
             <a:endParaRPr lang="de-DE"/>
           </a:p>
@@ -2070,7 +2070,7 @@
           <a:p>
             <a:fld id="{AC3A4DA2-F9D2-49C6-939E-AE8629D942AB}" type="datetimeFigureOut">
               <a:rPr lang="de-DE" smtClean="0"/>
-              <a:t>24.06.2020</a:t>
+              <a:t>25.06.2020</a:t>
             </a:fld>
             <a:endParaRPr lang="de-DE"/>
           </a:p>
@@ -2381,7 +2381,7 @@
           <a:p>
             <a:fld id="{AC3A4DA2-F9D2-49C6-939E-AE8629D942AB}" type="datetimeFigureOut">
               <a:rPr lang="de-DE" smtClean="0"/>
-              <a:t>24.06.2020</a:t>
+              <a:t>25.06.2020</a:t>
             </a:fld>
             <a:endParaRPr lang="de-DE"/>
           </a:p>
@@ -2669,7 +2669,7 @@
           <a:p>
             <a:fld id="{AC3A4DA2-F9D2-49C6-939E-AE8629D942AB}" type="datetimeFigureOut">
               <a:rPr lang="de-DE" smtClean="0"/>
-              <a:t>24.06.2020</a:t>
+              <a:t>25.06.2020</a:t>
             </a:fld>
             <a:endParaRPr lang="de-DE"/>
           </a:p>
@@ -2910,7 +2910,7 @@
           <a:p>
             <a:fld id="{AC3A4DA2-F9D2-49C6-939E-AE8629D942AB}" type="datetimeFigureOut">
               <a:rPr lang="de-DE" smtClean="0"/>
-              <a:t>24.06.2020</a:t>
+              <a:t>25.06.2020</a:t>
             </a:fld>
             <a:endParaRPr lang="de-DE"/>
           </a:p>
@@ -3395,13 +3395,13 @@
               <a:rPr lang="en-US" sz="2400" b="1" dirty="0">
                 <a:latin typeface="Corbel" panose="020B0503020204020204" pitchFamily="34" charset="0"/>
               </a:rPr>
-              <a:t>Creating a </a:t>
-            </a:r>
-            <a:r>
-              <a:rPr lang="en-US" sz="2400" b="1" dirty="0" err="1">
+              <a:t>Creating a g</a:t>
+            </a:r>
+            <a:r>
+              <a:rPr lang="en-US" sz="2400" b="1">
                 <a:latin typeface="Corbel" panose="020B0503020204020204" pitchFamily="34" charset="0"/>
               </a:rPr>
-              <a:t>Geoheatmap</a:t>
+              <a:t>eoheatmap</a:t>
             </a:r>
             <a:r>
               <a:rPr lang="en-US" sz="2400" b="1" dirty="0">

</xml_diff>